<commit_message>
Naming and color adjustments
</commit_message>
<xml_diff>
--- a/DockerForDevelopers.pptx
+++ b/DockerForDevelopers.pptx
@@ -456,20 +456,42 @@
 <file path=ppt/changesInfos/changesInfo1.xml><?xml version="1.0" encoding="utf-8"?>
 <pc:chgInfo xmlns:a="http://schemas.openxmlformats.org/drawingml/2006/main" xmlns:r="http://schemas.openxmlformats.org/officeDocument/2006/relationships" xmlns:ac="http://schemas.microsoft.com/office/drawing/2013/main/command" xmlns:pc="http://schemas.microsoft.com/office/powerpoint/2013/main/command">
   <pc:docChgLst>
-    <pc:chgData name="Maarten van Arem" userId="7e9dce823a96c2f2" providerId="LiveId" clId="{B6E13BA5-C1EB-4F1F-A362-6543E5E4341A}"/>
-    <pc:docChg chg="addSld modSld">
-      <pc:chgData name="Maarten van Arem" userId="7e9dce823a96c2f2" providerId="LiveId" clId="{B6E13BA5-C1EB-4F1F-A362-6543E5E4341A}" dt="2019-12-13T08:08:17.890" v="167" actId="20577"/>
+    <pc:chgData name="Maarten van Arem" userId="7e9dce823a96c2f2" providerId="LiveId" clId="{7C37B23C-2BD6-496D-8C1D-57AD572D7BF0}"/>
+    <pc:docChg chg="undo redo custSel addSld delSld modSld sldOrd">
+      <pc:chgData name="Maarten van Arem" userId="7e9dce823a96c2f2" providerId="LiveId" clId="{7C37B23C-2BD6-496D-8C1D-57AD572D7BF0}" dt="2019-12-15T16:18:22.491" v="6079" actId="20577"/>
       <pc:docMkLst>
         <pc:docMk/>
       </pc:docMkLst>
-      <pc:sldChg chg="modSp">
-        <pc:chgData name="Maarten van Arem" userId="7e9dce823a96c2f2" providerId="LiveId" clId="{B6E13BA5-C1EB-4F1F-A362-6543E5E4341A}" dt="2019-12-13T06:38:57.895" v="113" actId="20577"/>
+      <pc:sldChg chg="delSp modNotesTx">
+        <pc:chgData name="Maarten van Arem" userId="7e9dce823a96c2f2" providerId="LiveId" clId="{7C37B23C-2BD6-496D-8C1D-57AD572D7BF0}" dt="2019-12-08T15:45:29.985" v="4547" actId="478"/>
+        <pc:sldMkLst>
+          <pc:docMk/>
+          <pc:sldMk cId="0" sldId="258"/>
+        </pc:sldMkLst>
+        <pc:spChg chg="del">
+          <ac:chgData name="Maarten van Arem" userId="7e9dce823a96c2f2" providerId="LiveId" clId="{7C37B23C-2BD6-496D-8C1D-57AD572D7BF0}" dt="2019-12-08T15:45:29.985" v="4547" actId="478"/>
+          <ac:spMkLst>
+            <pc:docMk/>
+            <pc:sldMk cId="0" sldId="258"/>
+            <ac:spMk id="83" creationId="{00000000-0000-0000-0000-000000000000}"/>
+          </ac:spMkLst>
+        </pc:spChg>
+      </pc:sldChg>
+      <pc:sldChg chg="del">
+        <pc:chgData name="Maarten van Arem" userId="7e9dce823a96c2f2" providerId="LiveId" clId="{7C37B23C-2BD6-496D-8C1D-57AD572D7BF0}" dt="2019-12-07T20:32:48.313" v="1315" actId="47"/>
+        <pc:sldMkLst>
+          <pc:docMk/>
+          <pc:sldMk cId="1539875004" sldId="259"/>
+        </pc:sldMkLst>
+      </pc:sldChg>
+      <pc:sldChg chg="modSp modNotesTx">
+        <pc:chgData name="Maarten van Arem" userId="7e9dce823a96c2f2" providerId="LiveId" clId="{7C37B23C-2BD6-496D-8C1D-57AD572D7BF0}" dt="2019-12-08T15:41:46.633" v="4225" actId="6549"/>
         <pc:sldMkLst>
           <pc:docMk/>
           <pc:sldMk cId="745096730" sldId="260"/>
         </pc:sldMkLst>
         <pc:spChg chg="mod">
-          <ac:chgData name="Maarten van Arem" userId="7e9dce823a96c2f2" providerId="LiveId" clId="{B6E13BA5-C1EB-4F1F-A362-6543E5E4341A}" dt="2019-12-13T06:38:57.895" v="113" actId="20577"/>
+          <ac:chgData name="Maarten van Arem" userId="7e9dce823a96c2f2" providerId="LiveId" clId="{7C37B23C-2BD6-496D-8C1D-57AD572D7BF0}" dt="2019-12-08T15:41:21.143" v="4224" actId="20577"/>
           <ac:spMkLst>
             <pc:docMk/>
             <pc:sldMk cId="745096730" sldId="260"/>
@@ -477,14 +499,229 @@
           </ac:spMkLst>
         </pc:spChg>
       </pc:sldChg>
-      <pc:sldChg chg="modSp">
-        <pc:chgData name="Maarten van Arem" userId="7e9dce823a96c2f2" providerId="LiveId" clId="{B6E13BA5-C1EB-4F1F-A362-6543E5E4341A}" dt="2019-12-13T06:39:12.734" v="114" actId="14100"/>
+      <pc:sldChg chg="modSp modNotesTx">
+        <pc:chgData name="Maarten van Arem" userId="7e9dce823a96c2f2" providerId="LiveId" clId="{7C37B23C-2BD6-496D-8C1D-57AD572D7BF0}" dt="2019-12-15T12:49:56.834" v="4993"/>
+        <pc:sldMkLst>
+          <pc:docMk/>
+          <pc:sldMk cId="2952592422" sldId="261"/>
+        </pc:sldMkLst>
+        <pc:picChg chg="mod">
+          <ac:chgData name="Maarten van Arem" userId="7e9dce823a96c2f2" providerId="LiveId" clId="{7C37B23C-2BD6-496D-8C1D-57AD572D7BF0}" dt="2019-12-15T12:49:56.834" v="4993"/>
+          <ac:picMkLst>
+            <pc:docMk/>
+            <pc:sldMk cId="2952592422" sldId="261"/>
+            <ac:picMk id="1026" creationId="{28D6A43D-53CF-4F33-8902-9625D7D6D4A8}"/>
+          </ac:picMkLst>
+        </pc:picChg>
+      </pc:sldChg>
+      <pc:sldChg chg="del">
+        <pc:chgData name="Maarten van Arem" userId="7e9dce823a96c2f2" providerId="LiveId" clId="{7C37B23C-2BD6-496D-8C1D-57AD572D7BF0}" dt="2019-12-08T15:12:51.032" v="2237" actId="2696"/>
+        <pc:sldMkLst>
+          <pc:docMk/>
+          <pc:sldMk cId="1160636859" sldId="262"/>
+        </pc:sldMkLst>
+      </pc:sldChg>
+      <pc:sldChg chg="modSp modNotesTx">
+        <pc:chgData name="Maarten van Arem" userId="7e9dce823a96c2f2" providerId="LiveId" clId="{7C37B23C-2BD6-496D-8C1D-57AD572D7BF0}" dt="2019-12-15T12:49:46.765" v="4992"/>
+        <pc:sldMkLst>
+          <pc:docMk/>
+          <pc:sldMk cId="1472431772" sldId="263"/>
+        </pc:sldMkLst>
+        <pc:picChg chg="mod">
+          <ac:chgData name="Maarten van Arem" userId="7e9dce823a96c2f2" providerId="LiveId" clId="{7C37B23C-2BD6-496D-8C1D-57AD572D7BF0}" dt="2019-12-15T12:49:46.765" v="4992"/>
+          <ac:picMkLst>
+            <pc:docMk/>
+            <pc:sldMk cId="1472431772" sldId="263"/>
+            <ac:picMk id="7" creationId="{2001679D-FD92-4370-B972-6EDC554965C7}"/>
+          </ac:picMkLst>
+        </pc:picChg>
+        <pc:picChg chg="mod">
+          <ac:chgData name="Maarten van Arem" userId="7e9dce823a96c2f2" providerId="LiveId" clId="{7C37B23C-2BD6-496D-8C1D-57AD572D7BF0}" dt="2019-12-15T12:49:32.599" v="4991"/>
+          <ac:picMkLst>
+            <pc:docMk/>
+            <pc:sldMk cId="1472431772" sldId="263"/>
+            <ac:picMk id="1028" creationId="{CD63A6C0-D3AB-4612-ABA7-25D92CDB51A8}"/>
+          </ac:picMkLst>
+        </pc:picChg>
+      </pc:sldChg>
+      <pc:sldChg chg="del">
+        <pc:chgData name="Maarten van Arem" userId="7e9dce823a96c2f2" providerId="LiveId" clId="{7C37B23C-2BD6-496D-8C1D-57AD572D7BF0}" dt="2019-12-08T16:46:58.134" v="4557" actId="47"/>
+        <pc:sldMkLst>
+          <pc:docMk/>
+          <pc:sldMk cId="3118908984" sldId="264"/>
+        </pc:sldMkLst>
+      </pc:sldChg>
+      <pc:sldChg chg="del modNotesTx">
+        <pc:chgData name="Maarten van Arem" userId="7e9dce823a96c2f2" providerId="LiveId" clId="{7C37B23C-2BD6-496D-8C1D-57AD572D7BF0}" dt="2019-12-08T16:30:58.184" v="4548" actId="47"/>
+        <pc:sldMkLst>
+          <pc:docMk/>
+          <pc:sldMk cId="1495199804" sldId="265"/>
+        </pc:sldMkLst>
+      </pc:sldChg>
+      <pc:sldChg chg="modNotesTx">
+        <pc:chgData name="Maarten van Arem" userId="7e9dce823a96c2f2" providerId="LiveId" clId="{7C37B23C-2BD6-496D-8C1D-57AD572D7BF0}" dt="2019-12-08T15:43:28.063" v="4406" actId="20577"/>
+        <pc:sldMkLst>
+          <pc:docMk/>
+          <pc:sldMk cId="777015361" sldId="266"/>
+        </pc:sldMkLst>
+      </pc:sldChg>
+      <pc:sldChg chg="modSp del">
+        <pc:chgData name="Maarten van Arem" userId="7e9dce823a96c2f2" providerId="LiveId" clId="{7C37B23C-2BD6-496D-8C1D-57AD572D7BF0}" dt="2019-12-08T16:46:58.134" v="4557" actId="47"/>
+        <pc:sldMkLst>
+          <pc:docMk/>
+          <pc:sldMk cId="257293388" sldId="268"/>
+        </pc:sldMkLst>
+        <pc:spChg chg="mod">
+          <ac:chgData name="Maarten van Arem" userId="7e9dce823a96c2f2" providerId="LiveId" clId="{7C37B23C-2BD6-496D-8C1D-57AD572D7BF0}" dt="2019-12-08T16:31:06.116" v="4552" actId="6549"/>
+          <ac:spMkLst>
+            <pc:docMk/>
+            <pc:sldMk cId="257293388" sldId="268"/>
+            <ac:spMk id="3" creationId="{3C316FAB-BA5E-499A-B2DA-9D957B9C5E4D}"/>
+          </ac:spMkLst>
+        </pc:spChg>
+      </pc:sldChg>
+      <pc:sldChg chg="del">
+        <pc:chgData name="Maarten van Arem" userId="7e9dce823a96c2f2" providerId="LiveId" clId="{7C37B23C-2BD6-496D-8C1D-57AD572D7BF0}" dt="2019-12-08T16:46:58.134" v="4557" actId="47"/>
+        <pc:sldMkLst>
+          <pc:docMk/>
+          <pc:sldMk cId="3920091530" sldId="269"/>
+        </pc:sldMkLst>
+      </pc:sldChg>
+      <pc:sldChg chg="del">
+        <pc:chgData name="Maarten van Arem" userId="7e9dce823a96c2f2" providerId="LiveId" clId="{7C37B23C-2BD6-496D-8C1D-57AD572D7BF0}" dt="2019-12-08T16:46:58.134" v="4557" actId="47"/>
+        <pc:sldMkLst>
+          <pc:docMk/>
+          <pc:sldMk cId="104932815" sldId="270"/>
+        </pc:sldMkLst>
+      </pc:sldChg>
+      <pc:sldChg chg="del">
+        <pc:chgData name="Maarten van Arem" userId="7e9dce823a96c2f2" providerId="LiveId" clId="{7C37B23C-2BD6-496D-8C1D-57AD572D7BF0}" dt="2019-12-08T16:46:58.134" v="4557" actId="47"/>
+        <pc:sldMkLst>
+          <pc:docMk/>
+          <pc:sldMk cId="2983635302" sldId="271"/>
+        </pc:sldMkLst>
+      </pc:sldChg>
+      <pc:sldChg chg="del">
+        <pc:chgData name="Maarten van Arem" userId="7e9dce823a96c2f2" providerId="LiveId" clId="{7C37B23C-2BD6-496D-8C1D-57AD572D7BF0}" dt="2019-12-08T16:46:58.134" v="4557" actId="47"/>
+        <pc:sldMkLst>
+          <pc:docMk/>
+          <pc:sldMk cId="3547289501" sldId="272"/>
+        </pc:sldMkLst>
+      </pc:sldChg>
+      <pc:sldChg chg="del">
+        <pc:chgData name="Maarten van Arem" userId="7e9dce823a96c2f2" providerId="LiveId" clId="{7C37B23C-2BD6-496D-8C1D-57AD572D7BF0}" dt="2019-12-08T16:46:58.134" v="4557" actId="47"/>
+        <pc:sldMkLst>
+          <pc:docMk/>
+          <pc:sldMk cId="1852044557" sldId="273"/>
+        </pc:sldMkLst>
+      </pc:sldChg>
+      <pc:sldChg chg="del">
+        <pc:chgData name="Maarten van Arem" userId="7e9dce823a96c2f2" providerId="LiveId" clId="{7C37B23C-2BD6-496D-8C1D-57AD572D7BF0}" dt="2019-12-08T16:43:15.814" v="4555" actId="2696"/>
+        <pc:sldMkLst>
+          <pc:docMk/>
+          <pc:sldMk cId="851210938" sldId="274"/>
+        </pc:sldMkLst>
+      </pc:sldChg>
+      <pc:sldChg chg="addSp delSp modSp add addCm modNotesTx">
+        <pc:chgData name="Maarten van Arem" userId="7e9dce823a96c2f2" providerId="LiveId" clId="{7C37B23C-2BD6-496D-8C1D-57AD572D7BF0}" dt="2019-12-08T15:40:14.012" v="4046" actId="20577"/>
+        <pc:sldMkLst>
+          <pc:docMk/>
+          <pc:sldMk cId="2272220039" sldId="275"/>
+        </pc:sldMkLst>
+        <pc:spChg chg="add mod">
+          <ac:chgData name="Maarten van Arem" userId="7e9dce823a96c2f2" providerId="LiveId" clId="{7C37B23C-2BD6-496D-8C1D-57AD572D7BF0}" dt="2019-11-23T07:54:40.807" v="55" actId="6549"/>
+          <ac:spMkLst>
+            <pc:docMk/>
+            <pc:sldMk cId="2272220039" sldId="275"/>
+            <ac:spMk id="3" creationId="{52B9C00C-9B79-406C-BB8B-AA7C8D3BCF76}"/>
+          </ac:spMkLst>
+        </pc:spChg>
+        <pc:spChg chg="add del mod">
+          <ac:chgData name="Maarten van Arem" userId="7e9dce823a96c2f2" providerId="LiveId" clId="{7C37B23C-2BD6-496D-8C1D-57AD572D7BF0}" dt="2019-11-23T07:54:46.970" v="56" actId="478"/>
+          <ac:spMkLst>
+            <pc:docMk/>
+            <pc:sldMk cId="2272220039" sldId="275"/>
+            <ac:spMk id="4" creationId="{50127B9D-FCC4-4D3F-89BD-ECDE41099C65}"/>
+          </ac:spMkLst>
+        </pc:spChg>
+        <pc:picChg chg="add mod modCrop">
+          <ac:chgData name="Maarten van Arem" userId="7e9dce823a96c2f2" providerId="LiveId" clId="{7C37B23C-2BD6-496D-8C1D-57AD572D7BF0}" dt="2019-11-23T07:54:35.741" v="35" actId="1076"/>
+          <ac:picMkLst>
+            <pc:docMk/>
+            <pc:sldMk cId="2272220039" sldId="275"/>
+            <ac:picMk id="2" creationId="{86252FD2-599C-4E1D-A8E7-D3BF5FC9D29F}"/>
+          </ac:picMkLst>
+        </pc:picChg>
+      </pc:sldChg>
+      <pc:sldChg chg="addSp modSp add del">
+        <pc:chgData name="Maarten van Arem" userId="7e9dce823a96c2f2" providerId="LiveId" clId="{7C37B23C-2BD6-496D-8C1D-57AD572D7BF0}" dt="2019-12-08T16:43:56.265" v="4556" actId="47"/>
+        <pc:sldMkLst>
+          <pc:docMk/>
+          <pc:sldMk cId="975853916" sldId="276"/>
+        </pc:sldMkLst>
+        <pc:spChg chg="add mod">
+          <ac:chgData name="Maarten van Arem" userId="7e9dce823a96c2f2" providerId="LiveId" clId="{7C37B23C-2BD6-496D-8C1D-57AD572D7BF0}" dt="2019-11-23T08:07:48.920" v="735" actId="20577"/>
+          <ac:spMkLst>
+            <pc:docMk/>
+            <pc:sldMk cId="975853916" sldId="276"/>
+            <ac:spMk id="2" creationId="{A33E106E-0681-4BB9-AE71-4D51749C4D75}"/>
+          </ac:spMkLst>
+        </pc:spChg>
+        <pc:spChg chg="add mod">
+          <ac:chgData name="Maarten van Arem" userId="7e9dce823a96c2f2" providerId="LiveId" clId="{7C37B23C-2BD6-496D-8C1D-57AD572D7BF0}" dt="2019-11-23T08:08:01.101" v="783" actId="20577"/>
+          <ac:spMkLst>
+            <pc:docMk/>
+            <pc:sldMk cId="975853916" sldId="276"/>
+            <ac:spMk id="3" creationId="{9ADAA63C-CE7F-465A-9771-3B97700BFE43}"/>
+          </ac:spMkLst>
+        </pc:spChg>
+      </pc:sldChg>
+      <pc:sldChg chg="addSp modSp add del ord modNotesTx">
+        <pc:chgData name="Maarten van Arem" userId="7e9dce823a96c2f2" providerId="LiveId" clId="{7C37B23C-2BD6-496D-8C1D-57AD572D7BF0}" dt="2019-12-08T16:46:58.134" v="4557" actId="47"/>
+        <pc:sldMkLst>
+          <pc:docMk/>
+          <pc:sldMk cId="23708276" sldId="277"/>
+        </pc:sldMkLst>
+        <pc:spChg chg="add mod">
+          <ac:chgData name="Maarten van Arem" userId="7e9dce823a96c2f2" providerId="LiveId" clId="{7C37B23C-2BD6-496D-8C1D-57AD572D7BF0}" dt="2019-11-23T08:32:04.544" v="807" actId="6549"/>
+          <ac:spMkLst>
+            <pc:docMk/>
+            <pc:sldMk cId="23708276" sldId="277"/>
+            <ac:spMk id="2" creationId="{0673C36C-0817-4319-A03B-C316CD221453}"/>
+          </ac:spMkLst>
+        </pc:spChg>
+        <pc:spChg chg="add mod">
+          <ac:chgData name="Maarten van Arem" userId="7e9dce823a96c2f2" providerId="LiveId" clId="{7C37B23C-2BD6-496D-8C1D-57AD572D7BF0}" dt="2019-11-23T08:38:18.432" v="1236" actId="20577"/>
+          <ac:spMkLst>
+            <pc:docMk/>
+            <pc:sldMk cId="23708276" sldId="277"/>
+            <ac:spMk id="3" creationId="{0A8F314A-181F-4A14-8774-0B053354137C}"/>
+          </ac:spMkLst>
+        </pc:spChg>
+      </pc:sldChg>
+      <pc:sldChg chg="add del">
+        <pc:chgData name="Maarten van Arem" userId="7e9dce823a96c2f2" providerId="LiveId" clId="{7C37B23C-2BD6-496D-8C1D-57AD572D7BF0}" dt="2019-12-01T10:56:09.798" v="1239" actId="2696"/>
+        <pc:sldMkLst>
+          <pc:docMk/>
+          <pc:sldMk cId="2300763546" sldId="278"/>
+        </pc:sldMkLst>
+      </pc:sldChg>
+      <pc:sldChg chg="modSp add modNotesTx">
+        <pc:chgData name="Maarten van Arem" userId="7e9dce823a96c2f2" providerId="LiveId" clId="{7C37B23C-2BD6-496D-8C1D-57AD572D7BF0}" dt="2019-12-08T15:10:35.946" v="2229" actId="20577"/>
         <pc:sldMkLst>
           <pc:docMk/>
           <pc:sldMk cId="1049505787" sldId="279"/>
         </pc:sldMkLst>
         <pc:spChg chg="mod">
-          <ac:chgData name="Maarten van Arem" userId="7e9dce823a96c2f2" providerId="LiveId" clId="{B6E13BA5-C1EB-4F1F-A362-6543E5E4341A}" dt="2019-12-13T06:39:12.734" v="114" actId="14100"/>
+          <ac:chgData name="Maarten van Arem" userId="7e9dce823a96c2f2" providerId="LiveId" clId="{7C37B23C-2BD6-496D-8C1D-57AD572D7BF0}" dt="2019-12-01T10:56:12.718" v="1243" actId="20577"/>
+          <ac:spMkLst>
+            <pc:docMk/>
+            <pc:sldMk cId="1049505787" sldId="279"/>
+            <ac:spMk id="2" creationId="{5DAA27AC-A45D-4F2C-9C5A-46F8C3E28973}"/>
+          </ac:spMkLst>
+        </pc:spChg>
+        <pc:spChg chg="mod">
+          <ac:chgData name="Maarten van Arem" userId="7e9dce823a96c2f2" providerId="LiveId" clId="{7C37B23C-2BD6-496D-8C1D-57AD572D7BF0}" dt="2019-12-08T15:02:41.999" v="1377" actId="20577"/>
           <ac:spMkLst>
             <pc:docMk/>
             <pc:sldMk cId="1049505787" sldId="279"/>
@@ -492,48 +729,417 @@
           </ac:spMkLst>
         </pc:spChg>
       </pc:sldChg>
-      <pc:sldChg chg="modSp">
-        <pc:chgData name="Maarten van Arem" userId="7e9dce823a96c2f2" providerId="LiveId" clId="{B6E13BA5-C1EB-4F1F-A362-6543E5E4341A}" dt="2019-12-13T08:07:46.129" v="138" actId="20577"/>
+      <pc:sldChg chg="add del">
+        <pc:chgData name="Maarten van Arem" userId="7e9dce823a96c2f2" providerId="LiveId" clId="{7C37B23C-2BD6-496D-8C1D-57AD572D7BF0}" dt="2019-12-07T20:27:17.746" v="1305" actId="47"/>
+        <pc:sldMkLst>
+          <pc:docMk/>
+          <pc:sldMk cId="79209173" sldId="280"/>
+        </pc:sldMkLst>
+      </pc:sldChg>
+      <pc:sldChg chg="addSp delSp modSp add modNotesTx">
+        <pc:chgData name="Maarten van Arem" userId="7e9dce823a96c2f2" providerId="LiveId" clId="{7C37B23C-2BD6-496D-8C1D-57AD572D7BF0}" dt="2019-12-15T12:50:05.349" v="4994"/>
+        <pc:sldMkLst>
+          <pc:docMk/>
+          <pc:sldMk cId="4026242700" sldId="280"/>
+        </pc:sldMkLst>
+        <pc:spChg chg="add del mod">
+          <ac:chgData name="Maarten van Arem" userId="7e9dce823a96c2f2" providerId="LiveId" clId="{7C37B23C-2BD6-496D-8C1D-57AD572D7BF0}" dt="2019-12-07T20:38:17.203" v="1325" actId="478"/>
+          <ac:spMkLst>
+            <pc:docMk/>
+            <pc:sldMk cId="4026242700" sldId="280"/>
+            <ac:spMk id="4" creationId="{1CE8AFD2-F649-455F-825A-CEED8316D579}"/>
+          </ac:spMkLst>
+        </pc:spChg>
+        <pc:spChg chg="add del mod">
+          <ac:chgData name="Maarten van Arem" userId="7e9dce823a96c2f2" providerId="LiveId" clId="{7C37B23C-2BD6-496D-8C1D-57AD572D7BF0}" dt="2019-12-07T20:38:14.806" v="1324" actId="478"/>
+          <ac:spMkLst>
+            <pc:docMk/>
+            <pc:sldMk cId="4026242700" sldId="280"/>
+            <ac:spMk id="5" creationId="{3884273E-4404-4398-A636-99D567BF048E}"/>
+          </ac:spMkLst>
+        </pc:spChg>
+        <pc:spChg chg="add del">
+          <ac:chgData name="Maarten van Arem" userId="7e9dce823a96c2f2" providerId="LiveId" clId="{7C37B23C-2BD6-496D-8C1D-57AD572D7BF0}" dt="2019-12-07T20:38:21.201" v="1327"/>
+          <ac:spMkLst>
+            <pc:docMk/>
+            <pc:sldMk cId="4026242700" sldId="280"/>
+            <ac:spMk id="6" creationId="{5FB8DC3C-BCA8-49D0-B11B-85E1BCCFF916}"/>
+          </ac:spMkLst>
+        </pc:spChg>
+        <pc:spChg chg="add mod">
+          <ac:chgData name="Maarten van Arem" userId="7e9dce823a96c2f2" providerId="LiveId" clId="{7C37B23C-2BD6-496D-8C1D-57AD572D7BF0}" dt="2019-12-08T15:18:00.939" v="2240" actId="207"/>
+          <ac:spMkLst>
+            <pc:docMk/>
+            <pc:sldMk cId="4026242700" sldId="280"/>
+            <ac:spMk id="7" creationId="{120C729E-3FF4-4C09-81F5-7E99010A928F}"/>
+          </ac:spMkLst>
+        </pc:spChg>
+        <pc:picChg chg="add mod">
+          <ac:chgData name="Maarten van Arem" userId="7e9dce823a96c2f2" providerId="LiveId" clId="{7C37B23C-2BD6-496D-8C1D-57AD572D7BF0}" dt="2019-12-15T12:50:05.349" v="4994"/>
+          <ac:picMkLst>
+            <pc:docMk/>
+            <pc:sldMk cId="4026242700" sldId="280"/>
+            <ac:picMk id="3" creationId="{6015FCAB-EDFD-4C11-BC4E-101FA6ADA96D}"/>
+          </ac:picMkLst>
+        </pc:picChg>
+      </pc:sldChg>
+      <pc:sldChg chg="add del">
+        <pc:chgData name="Maarten van Arem" userId="7e9dce823a96c2f2" providerId="LiveId" clId="{7C37B23C-2BD6-496D-8C1D-57AD572D7BF0}" dt="2019-12-07T20:37:50.729" v="1321" actId="47"/>
+        <pc:sldMkLst>
+          <pc:docMk/>
+          <pc:sldMk cId="1472208384" sldId="281"/>
+        </pc:sldMkLst>
+      </pc:sldChg>
+      <pc:sldChg chg="addSp delSp modSp add del modAnim">
+        <pc:chgData name="Maarten van Arem" userId="7e9dce823a96c2f2" providerId="LiveId" clId="{7C37B23C-2BD6-496D-8C1D-57AD572D7BF0}" dt="2019-12-08T15:32:40.532" v="3198" actId="2696"/>
+        <pc:sldMkLst>
+          <pc:docMk/>
+          <pc:sldMk cId="3749564090" sldId="282"/>
+        </pc:sldMkLst>
+        <pc:spChg chg="add mod">
+          <ac:chgData name="Maarten van Arem" userId="7e9dce823a96c2f2" providerId="LiveId" clId="{7C37B23C-2BD6-496D-8C1D-57AD572D7BF0}" dt="2019-12-07T20:40:22.071" v="1347" actId="1035"/>
+          <ac:spMkLst>
+            <pc:docMk/>
+            <pc:sldMk cId="3749564090" sldId="282"/>
+            <ac:spMk id="3" creationId="{BF143D3D-980E-425B-A42A-BF80D3C5B9C5}"/>
+          </ac:spMkLst>
+        </pc:spChg>
+        <pc:picChg chg="del">
+          <ac:chgData name="Maarten van Arem" userId="7e9dce823a96c2f2" providerId="LiveId" clId="{7C37B23C-2BD6-496D-8C1D-57AD572D7BF0}" dt="2019-12-07T20:37:52.944" v="1322" actId="478"/>
+          <ac:picMkLst>
+            <pc:docMk/>
+            <pc:sldMk cId="3749564090" sldId="282"/>
+            <ac:picMk id="7" creationId="{2001679D-FD92-4370-B972-6EDC554965C7}"/>
+          </ac:picMkLst>
+        </pc:picChg>
+        <pc:picChg chg="add mod">
+          <ac:chgData name="Maarten van Arem" userId="7e9dce823a96c2f2" providerId="LiveId" clId="{7C37B23C-2BD6-496D-8C1D-57AD572D7BF0}" dt="2019-12-07T20:39:33.924" v="1337" actId="1076"/>
+          <ac:picMkLst>
+            <pc:docMk/>
+            <pc:sldMk cId="3749564090" sldId="282"/>
+            <ac:picMk id="1026" creationId="{0E82A5C6-EEF7-4550-BC7E-E4572C930AC9}"/>
+          </ac:picMkLst>
+        </pc:picChg>
+        <pc:picChg chg="del">
+          <ac:chgData name="Maarten van Arem" userId="7e9dce823a96c2f2" providerId="LiveId" clId="{7C37B23C-2BD6-496D-8C1D-57AD572D7BF0}" dt="2019-12-07T20:37:52.944" v="1322" actId="478"/>
+          <ac:picMkLst>
+            <pc:docMk/>
+            <pc:sldMk cId="3749564090" sldId="282"/>
+            <ac:picMk id="1028" creationId="{CD63A6C0-D3AB-4612-ABA7-25D92CDB51A8}"/>
+          </ac:picMkLst>
+        </pc:picChg>
+      </pc:sldChg>
+      <pc:sldChg chg="addSp delSp modSp add ord modNotesTx">
+        <pc:chgData name="Maarten van Arem" userId="7e9dce823a96c2f2" providerId="LiveId" clId="{7C37B23C-2BD6-496D-8C1D-57AD572D7BF0}" dt="2019-12-08T15:19:39.364" v="2295" actId="20577"/>
+        <pc:sldMkLst>
+          <pc:docMk/>
+          <pc:sldMk cId="2207115907" sldId="283"/>
+        </pc:sldMkLst>
+        <pc:spChg chg="add mod">
+          <ac:chgData name="Maarten van Arem" userId="7e9dce823a96c2f2" providerId="LiveId" clId="{7C37B23C-2BD6-496D-8C1D-57AD572D7BF0}" dt="2019-12-08T15:12:04.384" v="2236" actId="1076"/>
+          <ac:spMkLst>
+            <pc:docMk/>
+            <pc:sldMk cId="2207115907" sldId="283"/>
+            <ac:spMk id="2" creationId="{7654EA26-73F5-4281-AC1B-633739531A5A}"/>
+          </ac:spMkLst>
+        </pc:spChg>
+        <pc:picChg chg="add del mod">
+          <ac:chgData name="Maarten van Arem" userId="7e9dce823a96c2f2" providerId="LiveId" clId="{7C37B23C-2BD6-496D-8C1D-57AD572D7BF0}" dt="2019-12-08T15:11:04.349" v="2231"/>
+          <ac:picMkLst>
+            <pc:docMk/>
+            <pc:sldMk cId="2207115907" sldId="283"/>
+            <ac:picMk id="2050" creationId="{13FB8ED4-A869-442F-B47E-46DC9B1EE82F}"/>
+          </ac:picMkLst>
+        </pc:picChg>
+      </pc:sldChg>
+      <pc:sldChg chg="addSp modSp add">
+        <pc:chgData name="Maarten van Arem" userId="7e9dce823a96c2f2" providerId="LiveId" clId="{7C37B23C-2BD6-496D-8C1D-57AD572D7BF0}" dt="2019-12-15T16:05:32.755" v="6034" actId="20577"/>
         <pc:sldMkLst>
           <pc:docMk/>
           <pc:sldMk cId="3163330181" sldId="284"/>
         </pc:sldMkLst>
-        <pc:spChg chg="mod">
-          <ac:chgData name="Maarten van Arem" userId="7e9dce823a96c2f2" providerId="LiveId" clId="{B6E13BA5-C1EB-4F1F-A362-6543E5E4341A}" dt="2019-12-13T08:07:46.129" v="138" actId="20577"/>
+        <pc:spChg chg="add mod">
+          <ac:chgData name="Maarten van Arem" userId="7e9dce823a96c2f2" providerId="LiveId" clId="{7C37B23C-2BD6-496D-8C1D-57AD572D7BF0}" dt="2019-12-08T16:49:15.993" v="4559"/>
           <ac:spMkLst>
             <pc:docMk/>
             <pc:sldMk cId="3163330181" sldId="284"/>
             <ac:spMk id="2" creationId="{44FF5F26-E4A6-4F86-A341-4CBF409E75D8}"/>
           </ac:spMkLst>
         </pc:spChg>
+        <pc:spChg chg="add mod">
+          <ac:chgData name="Maarten van Arem" userId="7e9dce823a96c2f2" providerId="LiveId" clId="{7C37B23C-2BD6-496D-8C1D-57AD572D7BF0}" dt="2019-12-15T16:05:32.755" v="6034" actId="20577"/>
+          <ac:spMkLst>
+            <pc:docMk/>
+            <pc:sldMk cId="3163330181" sldId="284"/>
+            <ac:spMk id="3" creationId="{AF5ABFB7-8754-4AC6-A090-9F4767E65D3C}"/>
+          </ac:spMkLst>
+        </pc:spChg>
       </pc:sldChg>
-      <pc:sldChg chg="modSp add">
-        <pc:chgData name="Maarten van Arem" userId="7e9dce823a96c2f2" providerId="LiveId" clId="{B6E13BA5-C1EB-4F1F-A362-6543E5E4341A}" dt="2019-12-13T08:08:10.904" v="154" actId="20577"/>
+      <pc:sldChg chg="addSp modSp add del">
+        <pc:chgData name="Maarten van Arem" userId="7e9dce823a96c2f2" providerId="LiveId" clId="{7C37B23C-2BD6-496D-8C1D-57AD572D7BF0}" dt="2019-12-08T15:34:59.065" v="3203" actId="2696"/>
+        <pc:sldMkLst>
+          <pc:docMk/>
+          <pc:sldMk cId="3239733726" sldId="284"/>
+        </pc:sldMkLst>
+        <pc:spChg chg="add mod">
+          <ac:chgData name="Maarten van Arem" userId="7e9dce823a96c2f2" providerId="LiveId" clId="{7C37B23C-2BD6-496D-8C1D-57AD572D7BF0}" dt="2019-12-08T15:34:29.619" v="3202"/>
+          <ac:spMkLst>
+            <pc:docMk/>
+            <pc:sldMk cId="3239733726" sldId="284"/>
+            <ac:spMk id="2" creationId="{3B8A8E8D-15E7-47B9-A3E2-5B60DDDE1763}"/>
+          </ac:spMkLst>
+        </pc:spChg>
+        <pc:spChg chg="add mod">
+          <ac:chgData name="Maarten van Arem" userId="7e9dce823a96c2f2" providerId="LiveId" clId="{7C37B23C-2BD6-496D-8C1D-57AD572D7BF0}" dt="2019-12-08T15:34:29.619" v="3202"/>
+          <ac:spMkLst>
+            <pc:docMk/>
+            <pc:sldMk cId="3239733726" sldId="284"/>
+            <ac:spMk id="3" creationId="{E8F8E6C8-6DDD-45C0-A17B-3AFA155B71A4}"/>
+          </ac:spMkLst>
+        </pc:spChg>
+      </pc:sldChg>
+      <pc:sldChg chg="addSp modSp">
+        <pc:chgData name="Maarten van Arem" userId="7e9dce823a96c2f2" providerId="LiveId" clId="{7C37B23C-2BD6-496D-8C1D-57AD572D7BF0}" dt="2019-12-15T12:49:11.362" v="4989"/>
         <pc:sldMkLst>
           <pc:docMk/>
           <pc:sldMk cId="3517385063" sldId="285"/>
         </pc:sldMkLst>
         <pc:spChg chg="mod">
-          <ac:chgData name="Maarten van Arem" userId="7e9dce823a96c2f2" providerId="LiveId" clId="{B6E13BA5-C1EB-4F1F-A362-6543E5E4341A}" dt="2019-12-13T08:08:10.904" v="154" actId="20577"/>
+          <ac:chgData name="Maarten van Arem" userId="7e9dce823a96c2f2" providerId="LiveId" clId="{7C37B23C-2BD6-496D-8C1D-57AD572D7BF0}" dt="2019-12-15T12:44:23.239" v="4962" actId="20577"/>
           <ac:spMkLst>
             <pc:docMk/>
             <pc:sldMk cId="3517385063" sldId="285"/>
-            <ac:spMk id="2" creationId="{44FF5F26-E4A6-4F86-A341-4CBF409E75D8}"/>
+            <ac:spMk id="3" creationId="{AF5ABFB7-8754-4AC6-A090-9F4767E65D3C}"/>
           </ac:spMkLst>
         </pc:spChg>
+        <pc:picChg chg="add mod">
+          <ac:chgData name="Maarten van Arem" userId="7e9dce823a96c2f2" providerId="LiveId" clId="{7C37B23C-2BD6-496D-8C1D-57AD572D7BF0}" dt="2019-12-15T12:49:11.362" v="4989"/>
+          <ac:picMkLst>
+            <pc:docMk/>
+            <pc:sldMk cId="3517385063" sldId="285"/>
+            <ac:picMk id="5" creationId="{4A012C0A-8ED7-443F-B14E-5BBD211C9357}"/>
+          </ac:picMkLst>
+        </pc:picChg>
       </pc:sldChg>
-      <pc:sldChg chg="modSp add">
-        <pc:chgData name="Maarten van Arem" userId="7e9dce823a96c2f2" providerId="LiveId" clId="{B6E13BA5-C1EB-4F1F-A362-6543E5E4341A}" dt="2019-12-13T08:08:17.890" v="167" actId="20577"/>
+      <pc:sldChg chg="addSp delSp modSp">
+        <pc:chgData name="Maarten van Arem" userId="7e9dce823a96c2f2" providerId="LiveId" clId="{7C37B23C-2BD6-496D-8C1D-57AD572D7BF0}" dt="2019-12-15T12:48:24.173" v="4983" actId="1038"/>
         <pc:sldMkLst>
           <pc:docMk/>
           <pc:sldMk cId="2035742613" sldId="286"/>
         </pc:sldMkLst>
+        <pc:spChg chg="del">
+          <ac:chgData name="Maarten van Arem" userId="7e9dce823a96c2f2" providerId="LiveId" clId="{7C37B23C-2BD6-496D-8C1D-57AD572D7BF0}" dt="2019-12-15T12:47:22.747" v="4963"/>
+          <ac:spMkLst>
+            <pc:docMk/>
+            <pc:sldMk cId="2035742613" sldId="286"/>
+            <ac:spMk id="3" creationId="{AF5ABFB7-8754-4AC6-A090-9F4767E65D3C}"/>
+          </ac:spMkLst>
+        </pc:spChg>
+        <pc:picChg chg="add mod">
+          <ac:chgData name="Maarten van Arem" userId="7e9dce823a96c2f2" providerId="LiveId" clId="{7C37B23C-2BD6-496D-8C1D-57AD572D7BF0}" dt="2019-12-15T12:48:24.173" v="4983" actId="1038"/>
+          <ac:picMkLst>
+            <pc:docMk/>
+            <pc:sldMk cId="2035742613" sldId="286"/>
+            <ac:picMk id="5" creationId="{AD978B73-B2B5-4D4A-A42D-2E0164C9B281}"/>
+          </ac:picMkLst>
+        </pc:picChg>
+      </pc:sldChg>
+      <pc:sldChg chg="addSp modSp add">
+        <pc:chgData name="Maarten van Arem" userId="7e9dce823a96c2f2" providerId="LiveId" clId="{7C37B23C-2BD6-496D-8C1D-57AD572D7BF0}" dt="2019-12-15T16:18:22.491" v="6079" actId="20577"/>
+        <pc:sldMkLst>
+          <pc:docMk/>
+          <pc:sldMk cId="3570769667" sldId="287"/>
+        </pc:sldMkLst>
         <pc:spChg chg="mod">
-          <ac:chgData name="Maarten van Arem" userId="7e9dce823a96c2f2" providerId="LiveId" clId="{B6E13BA5-C1EB-4F1F-A362-6543E5E4341A}" dt="2019-12-13T08:08:17.890" v="167" actId="20577"/>
+          <ac:chgData name="Maarten van Arem" userId="7e9dce823a96c2f2" providerId="LiveId" clId="{7C37B23C-2BD6-496D-8C1D-57AD572D7BF0}" dt="2019-12-15T11:52:16.596" v="4578" actId="20577"/>
           <ac:spMkLst>
             <pc:docMk/>
-            <pc:sldMk cId="2035742613" sldId="286"/>
+            <pc:sldMk cId="3570769667" sldId="287"/>
             <ac:spMk id="2" creationId="{44FF5F26-E4A6-4F86-A341-4CBF409E75D8}"/>
+          </ac:spMkLst>
+        </pc:spChg>
+        <pc:spChg chg="mod">
+          <ac:chgData name="Maarten van Arem" userId="7e9dce823a96c2f2" providerId="LiveId" clId="{7C37B23C-2BD6-496D-8C1D-57AD572D7BF0}" dt="2019-12-15T16:18:22.491" v="6079" actId="20577"/>
+          <ac:spMkLst>
+            <pc:docMk/>
+            <pc:sldMk cId="3570769667" sldId="287"/>
+            <ac:spMk id="3" creationId="{AF5ABFB7-8754-4AC6-A090-9F4767E65D3C}"/>
+          </ac:spMkLst>
+        </pc:spChg>
+        <pc:picChg chg="add mod">
+          <ac:chgData name="Maarten van Arem" userId="7e9dce823a96c2f2" providerId="LiveId" clId="{7C37B23C-2BD6-496D-8C1D-57AD572D7BF0}" dt="2019-12-15T16:17:49.773" v="6075" actId="1076"/>
+          <ac:picMkLst>
+            <pc:docMk/>
+            <pc:sldMk cId="3570769667" sldId="287"/>
+            <ac:picMk id="5" creationId="{BADF0759-E012-469B-AAF8-4798CE78A3D2}"/>
+          </ac:picMkLst>
+        </pc:picChg>
+      </pc:sldChg>
+      <pc:sldChg chg="addSp delSp modSp add">
+        <pc:chgData name="Maarten van Arem" userId="7e9dce823a96c2f2" providerId="LiveId" clId="{7C37B23C-2BD6-496D-8C1D-57AD572D7BF0}" dt="2019-12-15T13:52:38.181" v="5006" actId="478"/>
+        <pc:sldMkLst>
+          <pc:docMk/>
+          <pc:sldMk cId="970525928" sldId="288"/>
+        </pc:sldMkLst>
+        <pc:spChg chg="mod">
+          <ac:chgData name="Maarten van Arem" userId="7e9dce823a96c2f2" providerId="LiveId" clId="{7C37B23C-2BD6-496D-8C1D-57AD572D7BF0}" dt="2019-12-15T13:52:32.566" v="5003" actId="20577"/>
+          <ac:spMkLst>
+            <pc:docMk/>
+            <pc:sldMk cId="970525928" sldId="288"/>
+            <ac:spMk id="2" creationId="{59520B48-725A-4180-BF57-5B93C6576738}"/>
+          </ac:spMkLst>
+        </pc:spChg>
+        <pc:spChg chg="del mod">
+          <ac:chgData name="Maarten van Arem" userId="7e9dce823a96c2f2" providerId="LiveId" clId="{7C37B23C-2BD6-496D-8C1D-57AD572D7BF0}" dt="2019-12-15T13:52:38.181" v="5006" actId="478"/>
+          <ac:spMkLst>
+            <pc:docMk/>
+            <pc:sldMk cId="970525928" sldId="288"/>
+            <ac:spMk id="3" creationId="{A912FA81-DA7D-4969-8537-9EBC41284BEE}"/>
+          </ac:spMkLst>
+        </pc:spChg>
+        <pc:spChg chg="add mod">
+          <ac:chgData name="Maarten van Arem" userId="7e9dce823a96c2f2" providerId="LiveId" clId="{7C37B23C-2BD6-496D-8C1D-57AD572D7BF0}" dt="2019-12-15T13:52:38.181" v="5006" actId="478"/>
+          <ac:spMkLst>
+            <pc:docMk/>
+            <pc:sldMk cId="970525928" sldId="288"/>
+            <ac:spMk id="5" creationId="{E3D2F74C-0377-4183-B6CB-A3967A2A021C}"/>
+          </ac:spMkLst>
+        </pc:spChg>
+      </pc:sldChg>
+      <pc:sldChg chg="addSp delSp modSp add modNotesTx">
+        <pc:chgData name="Maarten van Arem" userId="7e9dce823a96c2f2" providerId="LiveId" clId="{7C37B23C-2BD6-496D-8C1D-57AD572D7BF0}" dt="2019-12-15T14:22:21.703" v="5441" actId="6549"/>
+        <pc:sldMkLst>
+          <pc:docMk/>
+          <pc:sldMk cId="1272464515" sldId="289"/>
+        </pc:sldMkLst>
+        <pc:spChg chg="add mod">
+          <ac:chgData name="Maarten van Arem" userId="7e9dce823a96c2f2" providerId="LiveId" clId="{7C37B23C-2BD6-496D-8C1D-57AD572D7BF0}" dt="2019-12-15T14:09:42.513" v="5034" actId="20577"/>
+          <ac:spMkLst>
+            <pc:docMk/>
+            <pc:sldMk cId="1272464515" sldId="289"/>
+            <ac:spMk id="2" creationId="{C18D948A-02EE-41EE-A8C1-F731B60B3D0A}"/>
+          </ac:spMkLst>
+        </pc:spChg>
+        <pc:spChg chg="add del mod">
+          <ac:chgData name="Maarten van Arem" userId="7e9dce823a96c2f2" providerId="LiveId" clId="{7C37B23C-2BD6-496D-8C1D-57AD572D7BF0}" dt="2019-12-15T14:09:56.693" v="5036"/>
+          <ac:spMkLst>
+            <pc:docMk/>
+            <pc:sldMk cId="1272464515" sldId="289"/>
+            <ac:spMk id="3" creationId="{9A12B820-F99C-4688-A46C-A23FE246F18F}"/>
+          </ac:spMkLst>
+        </pc:spChg>
+        <pc:picChg chg="add mod">
+          <ac:chgData name="Maarten van Arem" userId="7e9dce823a96c2f2" providerId="LiveId" clId="{7C37B23C-2BD6-496D-8C1D-57AD572D7BF0}" dt="2019-12-15T14:10:06.292" v="5042" actId="1076"/>
+          <ac:picMkLst>
+            <pc:docMk/>
+            <pc:sldMk cId="1272464515" sldId="289"/>
+            <ac:picMk id="5" creationId="{568E2419-756E-4751-B113-AF450547C8AD}"/>
+          </ac:picMkLst>
+        </pc:picChg>
+      </pc:sldChg>
+      <pc:sldChg chg="addSp modSp add modNotesTx">
+        <pc:chgData name="Maarten van Arem" userId="7e9dce823a96c2f2" providerId="LiveId" clId="{7C37B23C-2BD6-496D-8C1D-57AD572D7BF0}" dt="2019-12-15T14:43:05.533" v="5900" actId="20577"/>
+        <pc:sldMkLst>
+          <pc:docMk/>
+          <pc:sldMk cId="171390095" sldId="290"/>
+        </pc:sldMkLst>
+        <pc:spChg chg="add mod">
+          <ac:chgData name="Maarten van Arem" userId="7e9dce823a96c2f2" providerId="LiveId" clId="{7C37B23C-2BD6-496D-8C1D-57AD572D7BF0}" dt="2019-12-15T14:22:43.281" v="5490" actId="20577"/>
+          <ac:spMkLst>
+            <pc:docMk/>
+            <pc:sldMk cId="171390095" sldId="290"/>
+            <ac:spMk id="2" creationId="{7D1C0952-48A1-4E48-A332-92ABE48D4C35}"/>
+          </ac:spMkLst>
+        </pc:spChg>
+        <pc:spChg chg="add mod">
+          <ac:chgData name="Maarten van Arem" userId="7e9dce823a96c2f2" providerId="LiveId" clId="{7C37B23C-2BD6-496D-8C1D-57AD572D7BF0}" dt="2019-12-15T14:23:58.729" v="5614" actId="20577"/>
+          <ac:spMkLst>
+            <pc:docMk/>
+            <pc:sldMk cId="171390095" sldId="290"/>
+            <ac:spMk id="3" creationId="{855C6074-4BED-41C8-B638-C34729F471F0}"/>
+          </ac:spMkLst>
+        </pc:spChg>
+      </pc:sldChg>
+      <pc:sldChg chg="addSp delSp modSp add del">
+        <pc:chgData name="Maarten van Arem" userId="7e9dce823a96c2f2" providerId="LiveId" clId="{7C37B23C-2BD6-496D-8C1D-57AD572D7BF0}" dt="2019-12-15T16:02:07.335" v="5907" actId="2696"/>
+        <pc:sldMkLst>
+          <pc:docMk/>
+          <pc:sldMk cId="16313518" sldId="291"/>
+        </pc:sldMkLst>
+        <pc:picChg chg="add del mod">
+          <ac:chgData name="Maarten van Arem" userId="7e9dce823a96c2f2" providerId="LiveId" clId="{7C37B23C-2BD6-496D-8C1D-57AD572D7BF0}" dt="2019-12-15T15:49:31.358" v="5903" actId="478"/>
+          <ac:picMkLst>
+            <pc:docMk/>
+            <pc:sldMk cId="16313518" sldId="291"/>
+            <ac:picMk id="1026" creationId="{45BDDC8F-59E6-468A-924F-D2C3145D3353}"/>
+          </ac:picMkLst>
+        </pc:picChg>
+        <pc:picChg chg="add del mod">
+          <ac:chgData name="Maarten van Arem" userId="7e9dce823a96c2f2" providerId="LiveId" clId="{7C37B23C-2BD6-496D-8C1D-57AD572D7BF0}" dt="2019-12-15T15:50:14.920" v="5906" actId="478"/>
+          <ac:picMkLst>
+            <pc:docMk/>
+            <pc:sldMk cId="16313518" sldId="291"/>
+            <ac:picMk id="1028" creationId="{A21CBB83-A1C0-4D57-83C0-0BAAB929F232}"/>
+          </ac:picMkLst>
+        </pc:picChg>
+      </pc:sldChg>
+      <pc:sldChg chg="modSp add">
+        <pc:chgData name="Maarten van Arem" userId="7e9dce823a96c2f2" providerId="LiveId" clId="{7C37B23C-2BD6-496D-8C1D-57AD572D7BF0}" dt="2019-12-15T16:03:49.393" v="5923" actId="6549"/>
+        <pc:sldMkLst>
+          <pc:docMk/>
+          <pc:sldMk cId="2520319555" sldId="291"/>
+        </pc:sldMkLst>
+        <pc:spChg chg="mod">
+          <ac:chgData name="Maarten van Arem" userId="7e9dce823a96c2f2" providerId="LiveId" clId="{7C37B23C-2BD6-496D-8C1D-57AD572D7BF0}" dt="2019-12-15T16:03:46.513" v="5922" actId="20577"/>
+          <ac:spMkLst>
+            <pc:docMk/>
+            <pc:sldMk cId="2520319555" sldId="291"/>
+            <ac:spMk id="2" creationId="{7D1C0952-48A1-4E48-A332-92ABE48D4C35}"/>
+          </ac:spMkLst>
+        </pc:spChg>
+        <pc:spChg chg="mod">
+          <ac:chgData name="Maarten van Arem" userId="7e9dce823a96c2f2" providerId="LiveId" clId="{7C37B23C-2BD6-496D-8C1D-57AD572D7BF0}" dt="2019-12-15T16:03:49.393" v="5923" actId="6549"/>
+          <ac:spMkLst>
+            <pc:docMk/>
+            <pc:sldMk cId="2520319555" sldId="291"/>
+            <ac:spMk id="3" creationId="{855C6074-4BED-41C8-B638-C34729F471F0}"/>
+          </ac:spMkLst>
+        </pc:spChg>
+      </pc:sldChg>
+      <pc:sldChg chg="add del">
+        <pc:chgData name="Maarten van Arem" userId="7e9dce823a96c2f2" providerId="LiveId" clId="{7C37B23C-2BD6-496D-8C1D-57AD572D7BF0}" dt="2019-12-15T14:22:31.322" v="5444" actId="47"/>
+        <pc:sldMkLst>
+          <pc:docMk/>
+          <pc:sldMk cId="2613462933" sldId="291"/>
+        </pc:sldMkLst>
+      </pc:sldChg>
+      <pc:sldChg chg="add del">
+        <pc:chgData name="Maarten van Arem" userId="7e9dce823a96c2f2" providerId="LiveId" clId="{7C37B23C-2BD6-496D-8C1D-57AD572D7BF0}" dt="2019-12-15T14:40:45.508" v="5783" actId="2696"/>
+        <pc:sldMkLst>
+          <pc:docMk/>
+          <pc:sldMk cId="3878111356" sldId="291"/>
+        </pc:sldMkLst>
+      </pc:sldChg>
+      <pc:sldChg chg="addSp modSp add">
+        <pc:chgData name="Maarten van Arem" userId="7e9dce823a96c2f2" providerId="LiveId" clId="{7C37B23C-2BD6-496D-8C1D-57AD572D7BF0}" dt="2019-12-15T16:04:15.551" v="6028" actId="27636"/>
+        <pc:sldMkLst>
+          <pc:docMk/>
+          <pc:sldMk cId="1312067004" sldId="292"/>
+        </pc:sldMkLst>
+        <pc:spChg chg="add mod">
+          <ac:chgData name="Maarten van Arem" userId="7e9dce823a96c2f2" providerId="LiveId" clId="{7C37B23C-2BD6-496D-8C1D-57AD572D7BF0}" dt="2019-12-15T16:04:00.485" v="5939" actId="20577"/>
+          <ac:spMkLst>
+            <pc:docMk/>
+            <pc:sldMk cId="1312067004" sldId="292"/>
+            <ac:spMk id="2" creationId="{86201E53-401F-485E-8B8D-6EA488AACAED}"/>
+          </ac:spMkLst>
+        </pc:spChg>
+        <pc:spChg chg="add mod">
+          <ac:chgData name="Maarten van Arem" userId="7e9dce823a96c2f2" providerId="LiveId" clId="{7C37B23C-2BD6-496D-8C1D-57AD572D7BF0}" dt="2019-12-15T16:04:15.551" v="6028" actId="27636"/>
+          <ac:spMkLst>
+            <pc:docMk/>
+            <pc:sldMk cId="1312067004" sldId="292"/>
+            <ac:spMk id="3" creationId="{5D663981-1FD5-4254-8AA8-8EC42B6D6B40}"/>
           </ac:spMkLst>
         </pc:spChg>
       </pc:sldChg>
@@ -1138,42 +1744,20 @@
     </pc:docChg>
   </pc:docChgLst>
   <pc:docChgLst>
-    <pc:chgData name="Maarten van Arem" userId="7e9dce823a96c2f2" providerId="LiveId" clId="{7C37B23C-2BD6-496D-8C1D-57AD572D7BF0}"/>
-    <pc:docChg chg="undo redo custSel addSld delSld modSld sldOrd">
-      <pc:chgData name="Maarten van Arem" userId="7e9dce823a96c2f2" providerId="LiveId" clId="{7C37B23C-2BD6-496D-8C1D-57AD572D7BF0}" dt="2019-12-15T16:18:22.491" v="6079" actId="20577"/>
+    <pc:chgData name="Maarten van Arem" userId="7e9dce823a96c2f2" providerId="LiveId" clId="{B6E13BA5-C1EB-4F1F-A362-6543E5E4341A}"/>
+    <pc:docChg chg="addSld modSld">
+      <pc:chgData name="Maarten van Arem" userId="7e9dce823a96c2f2" providerId="LiveId" clId="{B6E13BA5-C1EB-4F1F-A362-6543E5E4341A}" dt="2019-12-13T08:08:17.890" v="167" actId="20577"/>
       <pc:docMkLst>
         <pc:docMk/>
       </pc:docMkLst>
-      <pc:sldChg chg="delSp modNotesTx">
-        <pc:chgData name="Maarten van Arem" userId="7e9dce823a96c2f2" providerId="LiveId" clId="{7C37B23C-2BD6-496D-8C1D-57AD572D7BF0}" dt="2019-12-08T15:45:29.985" v="4547" actId="478"/>
-        <pc:sldMkLst>
-          <pc:docMk/>
-          <pc:sldMk cId="0" sldId="258"/>
-        </pc:sldMkLst>
-        <pc:spChg chg="del">
-          <ac:chgData name="Maarten van Arem" userId="7e9dce823a96c2f2" providerId="LiveId" clId="{7C37B23C-2BD6-496D-8C1D-57AD572D7BF0}" dt="2019-12-08T15:45:29.985" v="4547" actId="478"/>
-          <ac:spMkLst>
-            <pc:docMk/>
-            <pc:sldMk cId="0" sldId="258"/>
-            <ac:spMk id="83" creationId="{00000000-0000-0000-0000-000000000000}"/>
-          </ac:spMkLst>
-        </pc:spChg>
-      </pc:sldChg>
-      <pc:sldChg chg="del">
-        <pc:chgData name="Maarten van Arem" userId="7e9dce823a96c2f2" providerId="LiveId" clId="{7C37B23C-2BD6-496D-8C1D-57AD572D7BF0}" dt="2019-12-07T20:32:48.313" v="1315" actId="47"/>
-        <pc:sldMkLst>
-          <pc:docMk/>
-          <pc:sldMk cId="1539875004" sldId="259"/>
-        </pc:sldMkLst>
-      </pc:sldChg>
-      <pc:sldChg chg="modSp modNotesTx">
-        <pc:chgData name="Maarten van Arem" userId="7e9dce823a96c2f2" providerId="LiveId" clId="{7C37B23C-2BD6-496D-8C1D-57AD572D7BF0}" dt="2019-12-08T15:41:46.633" v="4225" actId="6549"/>
+      <pc:sldChg chg="modSp">
+        <pc:chgData name="Maarten van Arem" userId="7e9dce823a96c2f2" providerId="LiveId" clId="{B6E13BA5-C1EB-4F1F-A362-6543E5E4341A}" dt="2019-12-13T06:38:57.895" v="113" actId="20577"/>
         <pc:sldMkLst>
           <pc:docMk/>
           <pc:sldMk cId="745096730" sldId="260"/>
         </pc:sldMkLst>
         <pc:spChg chg="mod">
-          <ac:chgData name="Maarten van Arem" userId="7e9dce823a96c2f2" providerId="LiveId" clId="{7C37B23C-2BD6-496D-8C1D-57AD572D7BF0}" dt="2019-12-08T15:41:21.143" v="4224" actId="20577"/>
+          <ac:chgData name="Maarten van Arem" userId="7e9dce823a96c2f2" providerId="LiveId" clId="{B6E13BA5-C1EB-4F1F-A362-6543E5E4341A}" dt="2019-12-13T06:38:57.895" v="113" actId="20577"/>
           <ac:spMkLst>
             <pc:docMk/>
             <pc:sldMk cId="745096730" sldId="260"/>
@@ -1181,229 +1765,14 @@
           </ac:spMkLst>
         </pc:spChg>
       </pc:sldChg>
-      <pc:sldChg chg="modSp modNotesTx">
-        <pc:chgData name="Maarten van Arem" userId="7e9dce823a96c2f2" providerId="LiveId" clId="{7C37B23C-2BD6-496D-8C1D-57AD572D7BF0}" dt="2019-12-15T12:49:56.834" v="4993"/>
-        <pc:sldMkLst>
-          <pc:docMk/>
-          <pc:sldMk cId="2952592422" sldId="261"/>
-        </pc:sldMkLst>
-        <pc:picChg chg="mod">
-          <ac:chgData name="Maarten van Arem" userId="7e9dce823a96c2f2" providerId="LiveId" clId="{7C37B23C-2BD6-496D-8C1D-57AD572D7BF0}" dt="2019-12-15T12:49:56.834" v="4993"/>
-          <ac:picMkLst>
-            <pc:docMk/>
-            <pc:sldMk cId="2952592422" sldId="261"/>
-            <ac:picMk id="1026" creationId="{28D6A43D-53CF-4F33-8902-9625D7D6D4A8}"/>
-          </ac:picMkLst>
-        </pc:picChg>
-      </pc:sldChg>
-      <pc:sldChg chg="del">
-        <pc:chgData name="Maarten van Arem" userId="7e9dce823a96c2f2" providerId="LiveId" clId="{7C37B23C-2BD6-496D-8C1D-57AD572D7BF0}" dt="2019-12-08T15:12:51.032" v="2237" actId="2696"/>
-        <pc:sldMkLst>
-          <pc:docMk/>
-          <pc:sldMk cId="1160636859" sldId="262"/>
-        </pc:sldMkLst>
-      </pc:sldChg>
-      <pc:sldChg chg="modSp modNotesTx">
-        <pc:chgData name="Maarten van Arem" userId="7e9dce823a96c2f2" providerId="LiveId" clId="{7C37B23C-2BD6-496D-8C1D-57AD572D7BF0}" dt="2019-12-15T12:49:46.765" v="4992"/>
-        <pc:sldMkLst>
-          <pc:docMk/>
-          <pc:sldMk cId="1472431772" sldId="263"/>
-        </pc:sldMkLst>
-        <pc:picChg chg="mod">
-          <ac:chgData name="Maarten van Arem" userId="7e9dce823a96c2f2" providerId="LiveId" clId="{7C37B23C-2BD6-496D-8C1D-57AD572D7BF0}" dt="2019-12-15T12:49:46.765" v="4992"/>
-          <ac:picMkLst>
-            <pc:docMk/>
-            <pc:sldMk cId="1472431772" sldId="263"/>
-            <ac:picMk id="7" creationId="{2001679D-FD92-4370-B972-6EDC554965C7}"/>
-          </ac:picMkLst>
-        </pc:picChg>
-        <pc:picChg chg="mod">
-          <ac:chgData name="Maarten van Arem" userId="7e9dce823a96c2f2" providerId="LiveId" clId="{7C37B23C-2BD6-496D-8C1D-57AD572D7BF0}" dt="2019-12-15T12:49:32.599" v="4991"/>
-          <ac:picMkLst>
-            <pc:docMk/>
-            <pc:sldMk cId="1472431772" sldId="263"/>
-            <ac:picMk id="1028" creationId="{CD63A6C0-D3AB-4612-ABA7-25D92CDB51A8}"/>
-          </ac:picMkLst>
-        </pc:picChg>
-      </pc:sldChg>
-      <pc:sldChg chg="del">
-        <pc:chgData name="Maarten van Arem" userId="7e9dce823a96c2f2" providerId="LiveId" clId="{7C37B23C-2BD6-496D-8C1D-57AD572D7BF0}" dt="2019-12-08T16:46:58.134" v="4557" actId="47"/>
-        <pc:sldMkLst>
-          <pc:docMk/>
-          <pc:sldMk cId="3118908984" sldId="264"/>
-        </pc:sldMkLst>
-      </pc:sldChg>
-      <pc:sldChg chg="del modNotesTx">
-        <pc:chgData name="Maarten van Arem" userId="7e9dce823a96c2f2" providerId="LiveId" clId="{7C37B23C-2BD6-496D-8C1D-57AD572D7BF0}" dt="2019-12-08T16:30:58.184" v="4548" actId="47"/>
-        <pc:sldMkLst>
-          <pc:docMk/>
-          <pc:sldMk cId="1495199804" sldId="265"/>
-        </pc:sldMkLst>
-      </pc:sldChg>
-      <pc:sldChg chg="modNotesTx">
-        <pc:chgData name="Maarten van Arem" userId="7e9dce823a96c2f2" providerId="LiveId" clId="{7C37B23C-2BD6-496D-8C1D-57AD572D7BF0}" dt="2019-12-08T15:43:28.063" v="4406" actId="20577"/>
-        <pc:sldMkLst>
-          <pc:docMk/>
-          <pc:sldMk cId="777015361" sldId="266"/>
-        </pc:sldMkLst>
-      </pc:sldChg>
-      <pc:sldChg chg="modSp del">
-        <pc:chgData name="Maarten van Arem" userId="7e9dce823a96c2f2" providerId="LiveId" clId="{7C37B23C-2BD6-496D-8C1D-57AD572D7BF0}" dt="2019-12-08T16:46:58.134" v="4557" actId="47"/>
-        <pc:sldMkLst>
-          <pc:docMk/>
-          <pc:sldMk cId="257293388" sldId="268"/>
-        </pc:sldMkLst>
-        <pc:spChg chg="mod">
-          <ac:chgData name="Maarten van Arem" userId="7e9dce823a96c2f2" providerId="LiveId" clId="{7C37B23C-2BD6-496D-8C1D-57AD572D7BF0}" dt="2019-12-08T16:31:06.116" v="4552" actId="6549"/>
-          <ac:spMkLst>
-            <pc:docMk/>
-            <pc:sldMk cId="257293388" sldId="268"/>
-            <ac:spMk id="3" creationId="{3C316FAB-BA5E-499A-B2DA-9D957B9C5E4D}"/>
-          </ac:spMkLst>
-        </pc:spChg>
-      </pc:sldChg>
-      <pc:sldChg chg="del">
-        <pc:chgData name="Maarten van Arem" userId="7e9dce823a96c2f2" providerId="LiveId" clId="{7C37B23C-2BD6-496D-8C1D-57AD572D7BF0}" dt="2019-12-08T16:46:58.134" v="4557" actId="47"/>
-        <pc:sldMkLst>
-          <pc:docMk/>
-          <pc:sldMk cId="3920091530" sldId="269"/>
-        </pc:sldMkLst>
-      </pc:sldChg>
-      <pc:sldChg chg="del">
-        <pc:chgData name="Maarten van Arem" userId="7e9dce823a96c2f2" providerId="LiveId" clId="{7C37B23C-2BD6-496D-8C1D-57AD572D7BF0}" dt="2019-12-08T16:46:58.134" v="4557" actId="47"/>
-        <pc:sldMkLst>
-          <pc:docMk/>
-          <pc:sldMk cId="104932815" sldId="270"/>
-        </pc:sldMkLst>
-      </pc:sldChg>
-      <pc:sldChg chg="del">
-        <pc:chgData name="Maarten van Arem" userId="7e9dce823a96c2f2" providerId="LiveId" clId="{7C37B23C-2BD6-496D-8C1D-57AD572D7BF0}" dt="2019-12-08T16:46:58.134" v="4557" actId="47"/>
-        <pc:sldMkLst>
-          <pc:docMk/>
-          <pc:sldMk cId="2983635302" sldId="271"/>
-        </pc:sldMkLst>
-      </pc:sldChg>
-      <pc:sldChg chg="del">
-        <pc:chgData name="Maarten van Arem" userId="7e9dce823a96c2f2" providerId="LiveId" clId="{7C37B23C-2BD6-496D-8C1D-57AD572D7BF0}" dt="2019-12-08T16:46:58.134" v="4557" actId="47"/>
-        <pc:sldMkLst>
-          <pc:docMk/>
-          <pc:sldMk cId="3547289501" sldId="272"/>
-        </pc:sldMkLst>
-      </pc:sldChg>
-      <pc:sldChg chg="del">
-        <pc:chgData name="Maarten van Arem" userId="7e9dce823a96c2f2" providerId="LiveId" clId="{7C37B23C-2BD6-496D-8C1D-57AD572D7BF0}" dt="2019-12-08T16:46:58.134" v="4557" actId="47"/>
-        <pc:sldMkLst>
-          <pc:docMk/>
-          <pc:sldMk cId="1852044557" sldId="273"/>
-        </pc:sldMkLst>
-      </pc:sldChg>
-      <pc:sldChg chg="del">
-        <pc:chgData name="Maarten van Arem" userId="7e9dce823a96c2f2" providerId="LiveId" clId="{7C37B23C-2BD6-496D-8C1D-57AD572D7BF0}" dt="2019-12-08T16:43:15.814" v="4555" actId="2696"/>
-        <pc:sldMkLst>
-          <pc:docMk/>
-          <pc:sldMk cId="851210938" sldId="274"/>
-        </pc:sldMkLst>
-      </pc:sldChg>
-      <pc:sldChg chg="addSp delSp modSp add addCm modNotesTx">
-        <pc:chgData name="Maarten van Arem" userId="7e9dce823a96c2f2" providerId="LiveId" clId="{7C37B23C-2BD6-496D-8C1D-57AD572D7BF0}" dt="2019-12-08T15:40:14.012" v="4046" actId="20577"/>
-        <pc:sldMkLst>
-          <pc:docMk/>
-          <pc:sldMk cId="2272220039" sldId="275"/>
-        </pc:sldMkLst>
-        <pc:spChg chg="add mod">
-          <ac:chgData name="Maarten van Arem" userId="7e9dce823a96c2f2" providerId="LiveId" clId="{7C37B23C-2BD6-496D-8C1D-57AD572D7BF0}" dt="2019-11-23T07:54:40.807" v="55" actId="6549"/>
-          <ac:spMkLst>
-            <pc:docMk/>
-            <pc:sldMk cId="2272220039" sldId="275"/>
-            <ac:spMk id="3" creationId="{52B9C00C-9B79-406C-BB8B-AA7C8D3BCF76}"/>
-          </ac:spMkLst>
-        </pc:spChg>
-        <pc:spChg chg="add del mod">
-          <ac:chgData name="Maarten van Arem" userId="7e9dce823a96c2f2" providerId="LiveId" clId="{7C37B23C-2BD6-496D-8C1D-57AD572D7BF0}" dt="2019-11-23T07:54:46.970" v="56" actId="478"/>
-          <ac:spMkLst>
-            <pc:docMk/>
-            <pc:sldMk cId="2272220039" sldId="275"/>
-            <ac:spMk id="4" creationId="{50127B9D-FCC4-4D3F-89BD-ECDE41099C65}"/>
-          </ac:spMkLst>
-        </pc:spChg>
-        <pc:picChg chg="add mod modCrop">
-          <ac:chgData name="Maarten van Arem" userId="7e9dce823a96c2f2" providerId="LiveId" clId="{7C37B23C-2BD6-496D-8C1D-57AD572D7BF0}" dt="2019-11-23T07:54:35.741" v="35" actId="1076"/>
-          <ac:picMkLst>
-            <pc:docMk/>
-            <pc:sldMk cId="2272220039" sldId="275"/>
-            <ac:picMk id="2" creationId="{86252FD2-599C-4E1D-A8E7-D3BF5FC9D29F}"/>
-          </ac:picMkLst>
-        </pc:picChg>
-      </pc:sldChg>
-      <pc:sldChg chg="addSp modSp add del">
-        <pc:chgData name="Maarten van Arem" userId="7e9dce823a96c2f2" providerId="LiveId" clId="{7C37B23C-2BD6-496D-8C1D-57AD572D7BF0}" dt="2019-12-08T16:43:56.265" v="4556" actId="47"/>
-        <pc:sldMkLst>
-          <pc:docMk/>
-          <pc:sldMk cId="975853916" sldId="276"/>
-        </pc:sldMkLst>
-        <pc:spChg chg="add mod">
-          <ac:chgData name="Maarten van Arem" userId="7e9dce823a96c2f2" providerId="LiveId" clId="{7C37B23C-2BD6-496D-8C1D-57AD572D7BF0}" dt="2019-11-23T08:07:48.920" v="735" actId="20577"/>
-          <ac:spMkLst>
-            <pc:docMk/>
-            <pc:sldMk cId="975853916" sldId="276"/>
-            <ac:spMk id="2" creationId="{A33E106E-0681-4BB9-AE71-4D51749C4D75}"/>
-          </ac:spMkLst>
-        </pc:spChg>
-        <pc:spChg chg="add mod">
-          <ac:chgData name="Maarten van Arem" userId="7e9dce823a96c2f2" providerId="LiveId" clId="{7C37B23C-2BD6-496D-8C1D-57AD572D7BF0}" dt="2019-11-23T08:08:01.101" v="783" actId="20577"/>
-          <ac:spMkLst>
-            <pc:docMk/>
-            <pc:sldMk cId="975853916" sldId="276"/>
-            <ac:spMk id="3" creationId="{9ADAA63C-CE7F-465A-9771-3B97700BFE43}"/>
-          </ac:spMkLst>
-        </pc:spChg>
-      </pc:sldChg>
-      <pc:sldChg chg="addSp modSp add del ord modNotesTx">
-        <pc:chgData name="Maarten van Arem" userId="7e9dce823a96c2f2" providerId="LiveId" clId="{7C37B23C-2BD6-496D-8C1D-57AD572D7BF0}" dt="2019-12-08T16:46:58.134" v="4557" actId="47"/>
-        <pc:sldMkLst>
-          <pc:docMk/>
-          <pc:sldMk cId="23708276" sldId="277"/>
-        </pc:sldMkLst>
-        <pc:spChg chg="add mod">
-          <ac:chgData name="Maarten van Arem" userId="7e9dce823a96c2f2" providerId="LiveId" clId="{7C37B23C-2BD6-496D-8C1D-57AD572D7BF0}" dt="2019-11-23T08:32:04.544" v="807" actId="6549"/>
-          <ac:spMkLst>
-            <pc:docMk/>
-            <pc:sldMk cId="23708276" sldId="277"/>
-            <ac:spMk id="2" creationId="{0673C36C-0817-4319-A03B-C316CD221453}"/>
-          </ac:spMkLst>
-        </pc:spChg>
-        <pc:spChg chg="add mod">
-          <ac:chgData name="Maarten van Arem" userId="7e9dce823a96c2f2" providerId="LiveId" clId="{7C37B23C-2BD6-496D-8C1D-57AD572D7BF0}" dt="2019-11-23T08:38:18.432" v="1236" actId="20577"/>
-          <ac:spMkLst>
-            <pc:docMk/>
-            <pc:sldMk cId="23708276" sldId="277"/>
-            <ac:spMk id="3" creationId="{0A8F314A-181F-4A14-8774-0B053354137C}"/>
-          </ac:spMkLst>
-        </pc:spChg>
-      </pc:sldChg>
-      <pc:sldChg chg="add del">
-        <pc:chgData name="Maarten van Arem" userId="7e9dce823a96c2f2" providerId="LiveId" clId="{7C37B23C-2BD6-496D-8C1D-57AD572D7BF0}" dt="2019-12-01T10:56:09.798" v="1239" actId="2696"/>
-        <pc:sldMkLst>
-          <pc:docMk/>
-          <pc:sldMk cId="2300763546" sldId="278"/>
-        </pc:sldMkLst>
-      </pc:sldChg>
-      <pc:sldChg chg="modSp add modNotesTx">
-        <pc:chgData name="Maarten van Arem" userId="7e9dce823a96c2f2" providerId="LiveId" clId="{7C37B23C-2BD6-496D-8C1D-57AD572D7BF0}" dt="2019-12-08T15:10:35.946" v="2229" actId="20577"/>
+      <pc:sldChg chg="modSp">
+        <pc:chgData name="Maarten van Arem" userId="7e9dce823a96c2f2" providerId="LiveId" clId="{B6E13BA5-C1EB-4F1F-A362-6543E5E4341A}" dt="2019-12-13T06:39:12.734" v="114" actId="14100"/>
         <pc:sldMkLst>
           <pc:docMk/>
           <pc:sldMk cId="1049505787" sldId="279"/>
         </pc:sldMkLst>
         <pc:spChg chg="mod">
-          <ac:chgData name="Maarten van Arem" userId="7e9dce823a96c2f2" providerId="LiveId" clId="{7C37B23C-2BD6-496D-8C1D-57AD572D7BF0}" dt="2019-12-01T10:56:12.718" v="1243" actId="20577"/>
-          <ac:spMkLst>
-            <pc:docMk/>
-            <pc:sldMk cId="1049505787" sldId="279"/>
-            <ac:spMk id="2" creationId="{5DAA27AC-A45D-4F2C-9C5A-46F8C3E28973}"/>
-          </ac:spMkLst>
-        </pc:spChg>
-        <pc:spChg chg="mod">
-          <ac:chgData name="Maarten van Arem" userId="7e9dce823a96c2f2" providerId="LiveId" clId="{7C37B23C-2BD6-496D-8C1D-57AD572D7BF0}" dt="2019-12-08T15:02:41.999" v="1377" actId="20577"/>
+          <ac:chgData name="Maarten van Arem" userId="7e9dce823a96c2f2" providerId="LiveId" clId="{B6E13BA5-C1EB-4F1F-A362-6543E5E4341A}" dt="2019-12-13T06:39:12.734" v="114" actId="14100"/>
           <ac:spMkLst>
             <pc:docMk/>
             <pc:sldMk cId="1049505787" sldId="279"/>
@@ -1411,417 +1780,48 @@
           </ac:spMkLst>
         </pc:spChg>
       </pc:sldChg>
-      <pc:sldChg chg="add del">
-        <pc:chgData name="Maarten van Arem" userId="7e9dce823a96c2f2" providerId="LiveId" clId="{7C37B23C-2BD6-496D-8C1D-57AD572D7BF0}" dt="2019-12-07T20:27:17.746" v="1305" actId="47"/>
-        <pc:sldMkLst>
-          <pc:docMk/>
-          <pc:sldMk cId="79209173" sldId="280"/>
-        </pc:sldMkLst>
-      </pc:sldChg>
-      <pc:sldChg chg="addSp delSp modSp add modNotesTx">
-        <pc:chgData name="Maarten van Arem" userId="7e9dce823a96c2f2" providerId="LiveId" clId="{7C37B23C-2BD6-496D-8C1D-57AD572D7BF0}" dt="2019-12-15T12:50:05.349" v="4994"/>
-        <pc:sldMkLst>
-          <pc:docMk/>
-          <pc:sldMk cId="4026242700" sldId="280"/>
-        </pc:sldMkLst>
-        <pc:spChg chg="add del mod">
-          <ac:chgData name="Maarten van Arem" userId="7e9dce823a96c2f2" providerId="LiveId" clId="{7C37B23C-2BD6-496D-8C1D-57AD572D7BF0}" dt="2019-12-07T20:38:17.203" v="1325" actId="478"/>
-          <ac:spMkLst>
-            <pc:docMk/>
-            <pc:sldMk cId="4026242700" sldId="280"/>
-            <ac:spMk id="4" creationId="{1CE8AFD2-F649-455F-825A-CEED8316D579}"/>
-          </ac:spMkLst>
-        </pc:spChg>
-        <pc:spChg chg="add del mod">
-          <ac:chgData name="Maarten van Arem" userId="7e9dce823a96c2f2" providerId="LiveId" clId="{7C37B23C-2BD6-496D-8C1D-57AD572D7BF0}" dt="2019-12-07T20:38:14.806" v="1324" actId="478"/>
-          <ac:spMkLst>
-            <pc:docMk/>
-            <pc:sldMk cId="4026242700" sldId="280"/>
-            <ac:spMk id="5" creationId="{3884273E-4404-4398-A636-99D567BF048E}"/>
-          </ac:spMkLst>
-        </pc:spChg>
-        <pc:spChg chg="add del">
-          <ac:chgData name="Maarten van Arem" userId="7e9dce823a96c2f2" providerId="LiveId" clId="{7C37B23C-2BD6-496D-8C1D-57AD572D7BF0}" dt="2019-12-07T20:38:21.201" v="1327"/>
-          <ac:spMkLst>
-            <pc:docMk/>
-            <pc:sldMk cId="4026242700" sldId="280"/>
-            <ac:spMk id="6" creationId="{5FB8DC3C-BCA8-49D0-B11B-85E1BCCFF916}"/>
-          </ac:spMkLst>
-        </pc:spChg>
-        <pc:spChg chg="add mod">
-          <ac:chgData name="Maarten van Arem" userId="7e9dce823a96c2f2" providerId="LiveId" clId="{7C37B23C-2BD6-496D-8C1D-57AD572D7BF0}" dt="2019-12-08T15:18:00.939" v="2240" actId="207"/>
-          <ac:spMkLst>
-            <pc:docMk/>
-            <pc:sldMk cId="4026242700" sldId="280"/>
-            <ac:spMk id="7" creationId="{120C729E-3FF4-4C09-81F5-7E99010A928F}"/>
-          </ac:spMkLst>
-        </pc:spChg>
-        <pc:picChg chg="add mod">
-          <ac:chgData name="Maarten van Arem" userId="7e9dce823a96c2f2" providerId="LiveId" clId="{7C37B23C-2BD6-496D-8C1D-57AD572D7BF0}" dt="2019-12-15T12:50:05.349" v="4994"/>
-          <ac:picMkLst>
-            <pc:docMk/>
-            <pc:sldMk cId="4026242700" sldId="280"/>
-            <ac:picMk id="3" creationId="{6015FCAB-EDFD-4C11-BC4E-101FA6ADA96D}"/>
-          </ac:picMkLst>
-        </pc:picChg>
-      </pc:sldChg>
-      <pc:sldChg chg="add del">
-        <pc:chgData name="Maarten van Arem" userId="7e9dce823a96c2f2" providerId="LiveId" clId="{7C37B23C-2BD6-496D-8C1D-57AD572D7BF0}" dt="2019-12-07T20:37:50.729" v="1321" actId="47"/>
-        <pc:sldMkLst>
-          <pc:docMk/>
-          <pc:sldMk cId="1472208384" sldId="281"/>
-        </pc:sldMkLst>
-      </pc:sldChg>
-      <pc:sldChg chg="addSp delSp modSp add del modAnim">
-        <pc:chgData name="Maarten van Arem" userId="7e9dce823a96c2f2" providerId="LiveId" clId="{7C37B23C-2BD6-496D-8C1D-57AD572D7BF0}" dt="2019-12-08T15:32:40.532" v="3198" actId="2696"/>
-        <pc:sldMkLst>
-          <pc:docMk/>
-          <pc:sldMk cId="3749564090" sldId="282"/>
-        </pc:sldMkLst>
-        <pc:spChg chg="add mod">
-          <ac:chgData name="Maarten van Arem" userId="7e9dce823a96c2f2" providerId="LiveId" clId="{7C37B23C-2BD6-496D-8C1D-57AD572D7BF0}" dt="2019-12-07T20:40:22.071" v="1347" actId="1035"/>
-          <ac:spMkLst>
-            <pc:docMk/>
-            <pc:sldMk cId="3749564090" sldId="282"/>
-            <ac:spMk id="3" creationId="{BF143D3D-980E-425B-A42A-BF80D3C5B9C5}"/>
-          </ac:spMkLst>
-        </pc:spChg>
-        <pc:picChg chg="del">
-          <ac:chgData name="Maarten van Arem" userId="7e9dce823a96c2f2" providerId="LiveId" clId="{7C37B23C-2BD6-496D-8C1D-57AD572D7BF0}" dt="2019-12-07T20:37:52.944" v="1322" actId="478"/>
-          <ac:picMkLst>
-            <pc:docMk/>
-            <pc:sldMk cId="3749564090" sldId="282"/>
-            <ac:picMk id="7" creationId="{2001679D-FD92-4370-B972-6EDC554965C7}"/>
-          </ac:picMkLst>
-        </pc:picChg>
-        <pc:picChg chg="add mod">
-          <ac:chgData name="Maarten van Arem" userId="7e9dce823a96c2f2" providerId="LiveId" clId="{7C37B23C-2BD6-496D-8C1D-57AD572D7BF0}" dt="2019-12-07T20:39:33.924" v="1337" actId="1076"/>
-          <ac:picMkLst>
-            <pc:docMk/>
-            <pc:sldMk cId="3749564090" sldId="282"/>
-            <ac:picMk id="1026" creationId="{0E82A5C6-EEF7-4550-BC7E-E4572C930AC9}"/>
-          </ac:picMkLst>
-        </pc:picChg>
-        <pc:picChg chg="del">
-          <ac:chgData name="Maarten van Arem" userId="7e9dce823a96c2f2" providerId="LiveId" clId="{7C37B23C-2BD6-496D-8C1D-57AD572D7BF0}" dt="2019-12-07T20:37:52.944" v="1322" actId="478"/>
-          <ac:picMkLst>
-            <pc:docMk/>
-            <pc:sldMk cId="3749564090" sldId="282"/>
-            <ac:picMk id="1028" creationId="{CD63A6C0-D3AB-4612-ABA7-25D92CDB51A8}"/>
-          </ac:picMkLst>
-        </pc:picChg>
-      </pc:sldChg>
-      <pc:sldChg chg="addSp delSp modSp add ord modNotesTx">
-        <pc:chgData name="Maarten van Arem" userId="7e9dce823a96c2f2" providerId="LiveId" clId="{7C37B23C-2BD6-496D-8C1D-57AD572D7BF0}" dt="2019-12-08T15:19:39.364" v="2295" actId="20577"/>
-        <pc:sldMkLst>
-          <pc:docMk/>
-          <pc:sldMk cId="2207115907" sldId="283"/>
-        </pc:sldMkLst>
-        <pc:spChg chg="add mod">
-          <ac:chgData name="Maarten van Arem" userId="7e9dce823a96c2f2" providerId="LiveId" clId="{7C37B23C-2BD6-496D-8C1D-57AD572D7BF0}" dt="2019-12-08T15:12:04.384" v="2236" actId="1076"/>
-          <ac:spMkLst>
-            <pc:docMk/>
-            <pc:sldMk cId="2207115907" sldId="283"/>
-            <ac:spMk id="2" creationId="{7654EA26-73F5-4281-AC1B-633739531A5A}"/>
-          </ac:spMkLst>
-        </pc:spChg>
-        <pc:picChg chg="add del mod">
-          <ac:chgData name="Maarten van Arem" userId="7e9dce823a96c2f2" providerId="LiveId" clId="{7C37B23C-2BD6-496D-8C1D-57AD572D7BF0}" dt="2019-12-08T15:11:04.349" v="2231"/>
-          <ac:picMkLst>
-            <pc:docMk/>
-            <pc:sldMk cId="2207115907" sldId="283"/>
-            <ac:picMk id="2050" creationId="{13FB8ED4-A869-442F-B47E-46DC9B1EE82F}"/>
-          </ac:picMkLst>
-        </pc:picChg>
-      </pc:sldChg>
-      <pc:sldChg chg="addSp modSp add">
-        <pc:chgData name="Maarten van Arem" userId="7e9dce823a96c2f2" providerId="LiveId" clId="{7C37B23C-2BD6-496D-8C1D-57AD572D7BF0}" dt="2019-12-15T16:05:32.755" v="6034" actId="20577"/>
+      <pc:sldChg chg="modSp">
+        <pc:chgData name="Maarten van Arem" userId="7e9dce823a96c2f2" providerId="LiveId" clId="{B6E13BA5-C1EB-4F1F-A362-6543E5E4341A}" dt="2019-12-13T08:07:46.129" v="138" actId="20577"/>
         <pc:sldMkLst>
           <pc:docMk/>
           <pc:sldMk cId="3163330181" sldId="284"/>
         </pc:sldMkLst>
-        <pc:spChg chg="add mod">
-          <ac:chgData name="Maarten van Arem" userId="7e9dce823a96c2f2" providerId="LiveId" clId="{7C37B23C-2BD6-496D-8C1D-57AD572D7BF0}" dt="2019-12-08T16:49:15.993" v="4559"/>
+        <pc:spChg chg="mod">
+          <ac:chgData name="Maarten van Arem" userId="7e9dce823a96c2f2" providerId="LiveId" clId="{B6E13BA5-C1EB-4F1F-A362-6543E5E4341A}" dt="2019-12-13T08:07:46.129" v="138" actId="20577"/>
           <ac:spMkLst>
             <pc:docMk/>
             <pc:sldMk cId="3163330181" sldId="284"/>
             <ac:spMk id="2" creationId="{44FF5F26-E4A6-4F86-A341-4CBF409E75D8}"/>
           </ac:spMkLst>
         </pc:spChg>
-        <pc:spChg chg="add mod">
-          <ac:chgData name="Maarten van Arem" userId="7e9dce823a96c2f2" providerId="LiveId" clId="{7C37B23C-2BD6-496D-8C1D-57AD572D7BF0}" dt="2019-12-15T16:05:32.755" v="6034" actId="20577"/>
-          <ac:spMkLst>
-            <pc:docMk/>
-            <pc:sldMk cId="3163330181" sldId="284"/>
-            <ac:spMk id="3" creationId="{AF5ABFB7-8754-4AC6-A090-9F4767E65D3C}"/>
-          </ac:spMkLst>
-        </pc:spChg>
       </pc:sldChg>
-      <pc:sldChg chg="addSp modSp add del">
-        <pc:chgData name="Maarten van Arem" userId="7e9dce823a96c2f2" providerId="LiveId" clId="{7C37B23C-2BD6-496D-8C1D-57AD572D7BF0}" dt="2019-12-08T15:34:59.065" v="3203" actId="2696"/>
-        <pc:sldMkLst>
-          <pc:docMk/>
-          <pc:sldMk cId="3239733726" sldId="284"/>
-        </pc:sldMkLst>
-        <pc:spChg chg="add mod">
-          <ac:chgData name="Maarten van Arem" userId="7e9dce823a96c2f2" providerId="LiveId" clId="{7C37B23C-2BD6-496D-8C1D-57AD572D7BF0}" dt="2019-12-08T15:34:29.619" v="3202"/>
-          <ac:spMkLst>
-            <pc:docMk/>
-            <pc:sldMk cId="3239733726" sldId="284"/>
-            <ac:spMk id="2" creationId="{3B8A8E8D-15E7-47B9-A3E2-5B60DDDE1763}"/>
-          </ac:spMkLst>
-        </pc:spChg>
-        <pc:spChg chg="add mod">
-          <ac:chgData name="Maarten van Arem" userId="7e9dce823a96c2f2" providerId="LiveId" clId="{7C37B23C-2BD6-496D-8C1D-57AD572D7BF0}" dt="2019-12-08T15:34:29.619" v="3202"/>
-          <ac:spMkLst>
-            <pc:docMk/>
-            <pc:sldMk cId="3239733726" sldId="284"/>
-            <ac:spMk id="3" creationId="{E8F8E6C8-6DDD-45C0-A17B-3AFA155B71A4}"/>
-          </ac:spMkLst>
-        </pc:spChg>
-      </pc:sldChg>
-      <pc:sldChg chg="addSp modSp">
-        <pc:chgData name="Maarten van Arem" userId="7e9dce823a96c2f2" providerId="LiveId" clId="{7C37B23C-2BD6-496D-8C1D-57AD572D7BF0}" dt="2019-12-15T12:49:11.362" v="4989"/>
+      <pc:sldChg chg="modSp add">
+        <pc:chgData name="Maarten van Arem" userId="7e9dce823a96c2f2" providerId="LiveId" clId="{B6E13BA5-C1EB-4F1F-A362-6543E5E4341A}" dt="2019-12-13T08:08:10.904" v="154" actId="20577"/>
         <pc:sldMkLst>
           <pc:docMk/>
           <pc:sldMk cId="3517385063" sldId="285"/>
         </pc:sldMkLst>
         <pc:spChg chg="mod">
-          <ac:chgData name="Maarten van Arem" userId="7e9dce823a96c2f2" providerId="LiveId" clId="{7C37B23C-2BD6-496D-8C1D-57AD572D7BF0}" dt="2019-12-15T12:44:23.239" v="4962" actId="20577"/>
+          <ac:chgData name="Maarten van Arem" userId="7e9dce823a96c2f2" providerId="LiveId" clId="{B6E13BA5-C1EB-4F1F-A362-6543E5E4341A}" dt="2019-12-13T08:08:10.904" v="154" actId="20577"/>
           <ac:spMkLst>
             <pc:docMk/>
             <pc:sldMk cId="3517385063" sldId="285"/>
-            <ac:spMk id="3" creationId="{AF5ABFB7-8754-4AC6-A090-9F4767E65D3C}"/>
+            <ac:spMk id="2" creationId="{44FF5F26-E4A6-4F86-A341-4CBF409E75D8}"/>
           </ac:spMkLst>
         </pc:spChg>
-        <pc:picChg chg="add mod">
-          <ac:chgData name="Maarten van Arem" userId="7e9dce823a96c2f2" providerId="LiveId" clId="{7C37B23C-2BD6-496D-8C1D-57AD572D7BF0}" dt="2019-12-15T12:49:11.362" v="4989"/>
-          <ac:picMkLst>
-            <pc:docMk/>
-            <pc:sldMk cId="3517385063" sldId="285"/>
-            <ac:picMk id="5" creationId="{4A012C0A-8ED7-443F-B14E-5BBD211C9357}"/>
-          </ac:picMkLst>
-        </pc:picChg>
       </pc:sldChg>
-      <pc:sldChg chg="addSp delSp modSp">
-        <pc:chgData name="Maarten van Arem" userId="7e9dce823a96c2f2" providerId="LiveId" clId="{7C37B23C-2BD6-496D-8C1D-57AD572D7BF0}" dt="2019-12-15T12:48:24.173" v="4983" actId="1038"/>
+      <pc:sldChg chg="modSp add">
+        <pc:chgData name="Maarten van Arem" userId="7e9dce823a96c2f2" providerId="LiveId" clId="{B6E13BA5-C1EB-4F1F-A362-6543E5E4341A}" dt="2019-12-13T08:08:17.890" v="167" actId="20577"/>
         <pc:sldMkLst>
           <pc:docMk/>
           <pc:sldMk cId="2035742613" sldId="286"/>
         </pc:sldMkLst>
-        <pc:spChg chg="del">
-          <ac:chgData name="Maarten van Arem" userId="7e9dce823a96c2f2" providerId="LiveId" clId="{7C37B23C-2BD6-496D-8C1D-57AD572D7BF0}" dt="2019-12-15T12:47:22.747" v="4963"/>
+        <pc:spChg chg="mod">
+          <ac:chgData name="Maarten van Arem" userId="7e9dce823a96c2f2" providerId="LiveId" clId="{B6E13BA5-C1EB-4F1F-A362-6543E5E4341A}" dt="2019-12-13T08:08:17.890" v="167" actId="20577"/>
           <ac:spMkLst>
             <pc:docMk/>
             <pc:sldMk cId="2035742613" sldId="286"/>
-            <ac:spMk id="3" creationId="{AF5ABFB7-8754-4AC6-A090-9F4767E65D3C}"/>
-          </ac:spMkLst>
-        </pc:spChg>
-        <pc:picChg chg="add mod">
-          <ac:chgData name="Maarten van Arem" userId="7e9dce823a96c2f2" providerId="LiveId" clId="{7C37B23C-2BD6-496D-8C1D-57AD572D7BF0}" dt="2019-12-15T12:48:24.173" v="4983" actId="1038"/>
-          <ac:picMkLst>
-            <pc:docMk/>
-            <pc:sldMk cId="2035742613" sldId="286"/>
-            <ac:picMk id="5" creationId="{AD978B73-B2B5-4D4A-A42D-2E0164C9B281}"/>
-          </ac:picMkLst>
-        </pc:picChg>
-      </pc:sldChg>
-      <pc:sldChg chg="addSp modSp add">
-        <pc:chgData name="Maarten van Arem" userId="7e9dce823a96c2f2" providerId="LiveId" clId="{7C37B23C-2BD6-496D-8C1D-57AD572D7BF0}" dt="2019-12-15T16:18:22.491" v="6079" actId="20577"/>
-        <pc:sldMkLst>
-          <pc:docMk/>
-          <pc:sldMk cId="3570769667" sldId="287"/>
-        </pc:sldMkLst>
-        <pc:spChg chg="mod">
-          <ac:chgData name="Maarten van Arem" userId="7e9dce823a96c2f2" providerId="LiveId" clId="{7C37B23C-2BD6-496D-8C1D-57AD572D7BF0}" dt="2019-12-15T11:52:16.596" v="4578" actId="20577"/>
-          <ac:spMkLst>
-            <pc:docMk/>
-            <pc:sldMk cId="3570769667" sldId="287"/>
             <ac:spMk id="2" creationId="{44FF5F26-E4A6-4F86-A341-4CBF409E75D8}"/>
-          </ac:spMkLst>
-        </pc:spChg>
-        <pc:spChg chg="mod">
-          <ac:chgData name="Maarten van Arem" userId="7e9dce823a96c2f2" providerId="LiveId" clId="{7C37B23C-2BD6-496D-8C1D-57AD572D7BF0}" dt="2019-12-15T16:18:22.491" v="6079" actId="20577"/>
-          <ac:spMkLst>
-            <pc:docMk/>
-            <pc:sldMk cId="3570769667" sldId="287"/>
-            <ac:spMk id="3" creationId="{AF5ABFB7-8754-4AC6-A090-9F4767E65D3C}"/>
-          </ac:spMkLst>
-        </pc:spChg>
-        <pc:picChg chg="add mod">
-          <ac:chgData name="Maarten van Arem" userId="7e9dce823a96c2f2" providerId="LiveId" clId="{7C37B23C-2BD6-496D-8C1D-57AD572D7BF0}" dt="2019-12-15T16:17:49.773" v="6075" actId="1076"/>
-          <ac:picMkLst>
-            <pc:docMk/>
-            <pc:sldMk cId="3570769667" sldId="287"/>
-            <ac:picMk id="5" creationId="{BADF0759-E012-469B-AAF8-4798CE78A3D2}"/>
-          </ac:picMkLst>
-        </pc:picChg>
-      </pc:sldChg>
-      <pc:sldChg chg="addSp delSp modSp add">
-        <pc:chgData name="Maarten van Arem" userId="7e9dce823a96c2f2" providerId="LiveId" clId="{7C37B23C-2BD6-496D-8C1D-57AD572D7BF0}" dt="2019-12-15T13:52:38.181" v="5006" actId="478"/>
-        <pc:sldMkLst>
-          <pc:docMk/>
-          <pc:sldMk cId="970525928" sldId="288"/>
-        </pc:sldMkLst>
-        <pc:spChg chg="mod">
-          <ac:chgData name="Maarten van Arem" userId="7e9dce823a96c2f2" providerId="LiveId" clId="{7C37B23C-2BD6-496D-8C1D-57AD572D7BF0}" dt="2019-12-15T13:52:32.566" v="5003" actId="20577"/>
-          <ac:spMkLst>
-            <pc:docMk/>
-            <pc:sldMk cId="970525928" sldId="288"/>
-            <ac:spMk id="2" creationId="{59520B48-725A-4180-BF57-5B93C6576738}"/>
-          </ac:spMkLst>
-        </pc:spChg>
-        <pc:spChg chg="del mod">
-          <ac:chgData name="Maarten van Arem" userId="7e9dce823a96c2f2" providerId="LiveId" clId="{7C37B23C-2BD6-496D-8C1D-57AD572D7BF0}" dt="2019-12-15T13:52:38.181" v="5006" actId="478"/>
-          <ac:spMkLst>
-            <pc:docMk/>
-            <pc:sldMk cId="970525928" sldId="288"/>
-            <ac:spMk id="3" creationId="{A912FA81-DA7D-4969-8537-9EBC41284BEE}"/>
-          </ac:spMkLst>
-        </pc:spChg>
-        <pc:spChg chg="add mod">
-          <ac:chgData name="Maarten van Arem" userId="7e9dce823a96c2f2" providerId="LiveId" clId="{7C37B23C-2BD6-496D-8C1D-57AD572D7BF0}" dt="2019-12-15T13:52:38.181" v="5006" actId="478"/>
-          <ac:spMkLst>
-            <pc:docMk/>
-            <pc:sldMk cId="970525928" sldId="288"/>
-            <ac:spMk id="5" creationId="{E3D2F74C-0377-4183-B6CB-A3967A2A021C}"/>
-          </ac:spMkLst>
-        </pc:spChg>
-      </pc:sldChg>
-      <pc:sldChg chg="addSp delSp modSp add modNotesTx">
-        <pc:chgData name="Maarten van Arem" userId="7e9dce823a96c2f2" providerId="LiveId" clId="{7C37B23C-2BD6-496D-8C1D-57AD572D7BF0}" dt="2019-12-15T14:22:21.703" v="5441" actId="6549"/>
-        <pc:sldMkLst>
-          <pc:docMk/>
-          <pc:sldMk cId="1272464515" sldId="289"/>
-        </pc:sldMkLst>
-        <pc:spChg chg="add mod">
-          <ac:chgData name="Maarten van Arem" userId="7e9dce823a96c2f2" providerId="LiveId" clId="{7C37B23C-2BD6-496D-8C1D-57AD572D7BF0}" dt="2019-12-15T14:09:42.513" v="5034" actId="20577"/>
-          <ac:spMkLst>
-            <pc:docMk/>
-            <pc:sldMk cId="1272464515" sldId="289"/>
-            <ac:spMk id="2" creationId="{C18D948A-02EE-41EE-A8C1-F731B60B3D0A}"/>
-          </ac:spMkLst>
-        </pc:spChg>
-        <pc:spChg chg="add del mod">
-          <ac:chgData name="Maarten van Arem" userId="7e9dce823a96c2f2" providerId="LiveId" clId="{7C37B23C-2BD6-496D-8C1D-57AD572D7BF0}" dt="2019-12-15T14:09:56.693" v="5036"/>
-          <ac:spMkLst>
-            <pc:docMk/>
-            <pc:sldMk cId="1272464515" sldId="289"/>
-            <ac:spMk id="3" creationId="{9A12B820-F99C-4688-A46C-A23FE246F18F}"/>
-          </ac:spMkLst>
-        </pc:spChg>
-        <pc:picChg chg="add mod">
-          <ac:chgData name="Maarten van Arem" userId="7e9dce823a96c2f2" providerId="LiveId" clId="{7C37B23C-2BD6-496D-8C1D-57AD572D7BF0}" dt="2019-12-15T14:10:06.292" v="5042" actId="1076"/>
-          <ac:picMkLst>
-            <pc:docMk/>
-            <pc:sldMk cId="1272464515" sldId="289"/>
-            <ac:picMk id="5" creationId="{568E2419-756E-4751-B113-AF450547C8AD}"/>
-          </ac:picMkLst>
-        </pc:picChg>
-      </pc:sldChg>
-      <pc:sldChg chg="addSp modSp add modNotesTx">
-        <pc:chgData name="Maarten van Arem" userId="7e9dce823a96c2f2" providerId="LiveId" clId="{7C37B23C-2BD6-496D-8C1D-57AD572D7BF0}" dt="2019-12-15T14:43:05.533" v="5900" actId="20577"/>
-        <pc:sldMkLst>
-          <pc:docMk/>
-          <pc:sldMk cId="171390095" sldId="290"/>
-        </pc:sldMkLst>
-        <pc:spChg chg="add mod">
-          <ac:chgData name="Maarten van Arem" userId="7e9dce823a96c2f2" providerId="LiveId" clId="{7C37B23C-2BD6-496D-8C1D-57AD572D7BF0}" dt="2019-12-15T14:22:43.281" v="5490" actId="20577"/>
-          <ac:spMkLst>
-            <pc:docMk/>
-            <pc:sldMk cId="171390095" sldId="290"/>
-            <ac:spMk id="2" creationId="{7D1C0952-48A1-4E48-A332-92ABE48D4C35}"/>
-          </ac:spMkLst>
-        </pc:spChg>
-        <pc:spChg chg="add mod">
-          <ac:chgData name="Maarten van Arem" userId="7e9dce823a96c2f2" providerId="LiveId" clId="{7C37B23C-2BD6-496D-8C1D-57AD572D7BF0}" dt="2019-12-15T14:23:58.729" v="5614" actId="20577"/>
-          <ac:spMkLst>
-            <pc:docMk/>
-            <pc:sldMk cId="171390095" sldId="290"/>
-            <ac:spMk id="3" creationId="{855C6074-4BED-41C8-B638-C34729F471F0}"/>
-          </ac:spMkLst>
-        </pc:spChg>
-      </pc:sldChg>
-      <pc:sldChg chg="addSp delSp modSp add del">
-        <pc:chgData name="Maarten van Arem" userId="7e9dce823a96c2f2" providerId="LiveId" clId="{7C37B23C-2BD6-496D-8C1D-57AD572D7BF0}" dt="2019-12-15T16:02:07.335" v="5907" actId="2696"/>
-        <pc:sldMkLst>
-          <pc:docMk/>
-          <pc:sldMk cId="16313518" sldId="291"/>
-        </pc:sldMkLst>
-        <pc:picChg chg="add del mod">
-          <ac:chgData name="Maarten van Arem" userId="7e9dce823a96c2f2" providerId="LiveId" clId="{7C37B23C-2BD6-496D-8C1D-57AD572D7BF0}" dt="2019-12-15T15:49:31.358" v="5903" actId="478"/>
-          <ac:picMkLst>
-            <pc:docMk/>
-            <pc:sldMk cId="16313518" sldId="291"/>
-            <ac:picMk id="1026" creationId="{45BDDC8F-59E6-468A-924F-D2C3145D3353}"/>
-          </ac:picMkLst>
-        </pc:picChg>
-        <pc:picChg chg="add del mod">
-          <ac:chgData name="Maarten van Arem" userId="7e9dce823a96c2f2" providerId="LiveId" clId="{7C37B23C-2BD6-496D-8C1D-57AD572D7BF0}" dt="2019-12-15T15:50:14.920" v="5906" actId="478"/>
-          <ac:picMkLst>
-            <pc:docMk/>
-            <pc:sldMk cId="16313518" sldId="291"/>
-            <ac:picMk id="1028" creationId="{A21CBB83-A1C0-4D57-83C0-0BAAB929F232}"/>
-          </ac:picMkLst>
-        </pc:picChg>
-      </pc:sldChg>
-      <pc:sldChg chg="modSp add">
-        <pc:chgData name="Maarten van Arem" userId="7e9dce823a96c2f2" providerId="LiveId" clId="{7C37B23C-2BD6-496D-8C1D-57AD572D7BF0}" dt="2019-12-15T16:03:49.393" v="5923" actId="6549"/>
-        <pc:sldMkLst>
-          <pc:docMk/>
-          <pc:sldMk cId="2520319555" sldId="291"/>
-        </pc:sldMkLst>
-        <pc:spChg chg="mod">
-          <ac:chgData name="Maarten van Arem" userId="7e9dce823a96c2f2" providerId="LiveId" clId="{7C37B23C-2BD6-496D-8C1D-57AD572D7BF0}" dt="2019-12-15T16:03:46.513" v="5922" actId="20577"/>
-          <ac:spMkLst>
-            <pc:docMk/>
-            <pc:sldMk cId="2520319555" sldId="291"/>
-            <ac:spMk id="2" creationId="{7D1C0952-48A1-4E48-A332-92ABE48D4C35}"/>
-          </ac:spMkLst>
-        </pc:spChg>
-        <pc:spChg chg="mod">
-          <ac:chgData name="Maarten van Arem" userId="7e9dce823a96c2f2" providerId="LiveId" clId="{7C37B23C-2BD6-496D-8C1D-57AD572D7BF0}" dt="2019-12-15T16:03:49.393" v="5923" actId="6549"/>
-          <ac:spMkLst>
-            <pc:docMk/>
-            <pc:sldMk cId="2520319555" sldId="291"/>
-            <ac:spMk id="3" creationId="{855C6074-4BED-41C8-B638-C34729F471F0}"/>
-          </ac:spMkLst>
-        </pc:spChg>
-      </pc:sldChg>
-      <pc:sldChg chg="add del">
-        <pc:chgData name="Maarten van Arem" userId="7e9dce823a96c2f2" providerId="LiveId" clId="{7C37B23C-2BD6-496D-8C1D-57AD572D7BF0}" dt="2019-12-15T14:22:31.322" v="5444" actId="47"/>
-        <pc:sldMkLst>
-          <pc:docMk/>
-          <pc:sldMk cId="2613462933" sldId="291"/>
-        </pc:sldMkLst>
-      </pc:sldChg>
-      <pc:sldChg chg="add del">
-        <pc:chgData name="Maarten van Arem" userId="7e9dce823a96c2f2" providerId="LiveId" clId="{7C37B23C-2BD6-496D-8C1D-57AD572D7BF0}" dt="2019-12-15T14:40:45.508" v="5783" actId="2696"/>
-        <pc:sldMkLst>
-          <pc:docMk/>
-          <pc:sldMk cId="3878111356" sldId="291"/>
-        </pc:sldMkLst>
-      </pc:sldChg>
-      <pc:sldChg chg="addSp modSp add">
-        <pc:chgData name="Maarten van Arem" userId="7e9dce823a96c2f2" providerId="LiveId" clId="{7C37B23C-2BD6-496D-8C1D-57AD572D7BF0}" dt="2019-12-15T16:04:15.551" v="6028" actId="27636"/>
-        <pc:sldMkLst>
-          <pc:docMk/>
-          <pc:sldMk cId="1312067004" sldId="292"/>
-        </pc:sldMkLst>
-        <pc:spChg chg="add mod">
-          <ac:chgData name="Maarten van Arem" userId="7e9dce823a96c2f2" providerId="LiveId" clId="{7C37B23C-2BD6-496D-8C1D-57AD572D7BF0}" dt="2019-12-15T16:04:00.485" v="5939" actId="20577"/>
-          <ac:spMkLst>
-            <pc:docMk/>
-            <pc:sldMk cId="1312067004" sldId="292"/>
-            <ac:spMk id="2" creationId="{86201E53-401F-485E-8B8D-6EA488AACAED}"/>
-          </ac:spMkLst>
-        </pc:spChg>
-        <pc:spChg chg="add mod">
-          <ac:chgData name="Maarten van Arem" userId="7e9dce823a96c2f2" providerId="LiveId" clId="{7C37B23C-2BD6-496D-8C1D-57AD572D7BF0}" dt="2019-12-15T16:04:15.551" v="6028" actId="27636"/>
-          <ac:spMkLst>
-            <pc:docMk/>
-            <pc:sldMk cId="1312067004" sldId="292"/>
-            <ac:spMk id="3" creationId="{5D663981-1FD5-4254-8AA8-8EC42B6D6B40}"/>
           </ac:spMkLst>
         </pc:spChg>
       </pc:sldChg>
@@ -3827,7 +3827,7 @@
           <p:nvPr userDrawn="1"/>
         </p:nvPicPr>
         <p:blipFill>
-          <a:blip r:embed="rId3">
+          <a:blip r:embed="rId3" cstate="email">
             <a:extLst>
               <a:ext uri="{28A0092B-C50C-407E-A947-70E740481C1C}">
                 <a14:useLocalDpi xmlns:a14="http://schemas.microsoft.com/office/drawing/2010/main" val="0"/>
@@ -3978,7 +3978,7 @@
           </a:ln>
           <a:extLst>
             <a:ext uri="{C572A759-6A51-4108-AA02-DFA0A04FC94B}">
-              <ma14:wrappingTextBoxFlag xmlns:ma14="http://schemas.microsoft.com/office/mac/drawingml/2011/main" xmlns="" val="1"/>
+              <ma14:wrappingTextBoxFlag xmlns="" xmlns:ma14="http://schemas.microsoft.com/office/mac/drawingml/2011/main" val="1"/>
             </a:ext>
           </a:extLst>
         </p:spPr>
@@ -4017,7 +4017,7 @@
           </a:ln>
           <a:extLst>
             <a:ext uri="{C572A759-6A51-4108-AA02-DFA0A04FC94B}">
-              <ma14:wrappingTextBoxFlag xmlns:ma14="http://schemas.microsoft.com/office/mac/drawingml/2011/main" xmlns="" val="1"/>
+              <ma14:wrappingTextBoxFlag xmlns="" xmlns:ma14="http://schemas.microsoft.com/office/mac/drawingml/2011/main" val="1"/>
             </a:ext>
           </a:extLst>
         </p:spPr>
@@ -4895,7 +4895,7 @@
           </a:ln>
           <a:extLst>
             <a:ext uri="{C572A759-6A51-4108-AA02-DFA0A04FC94B}">
-              <ma14:wrappingTextBoxFlag xmlns:ma14="http://schemas.microsoft.com/office/mac/drawingml/2011/main" xmlns="" val="1"/>
+              <ma14:wrappingTextBoxFlag xmlns="" xmlns:ma14="http://schemas.microsoft.com/office/mac/drawingml/2011/main" val="1"/>
             </a:ext>
           </a:extLst>
         </p:spPr>
@@ -4948,7 +4948,7 @@
           </a:ln>
           <a:extLst>
             <a:ext uri="{C572A759-6A51-4108-AA02-DFA0A04FC94B}">
-              <ma14:wrappingTextBoxFlag xmlns:ma14="http://schemas.microsoft.com/office/mac/drawingml/2011/main" xmlns="" val="1"/>
+              <ma14:wrappingTextBoxFlag xmlns="" xmlns:ma14="http://schemas.microsoft.com/office/mac/drawingml/2011/main" val="1"/>
             </a:ext>
           </a:extLst>
         </p:spPr>
@@ -5368,6 +5368,13 @@
         </p:nvPicPr>
         <p:blipFill>
           <a:blip r:embed="rId3">
+            <a:duotone>
+              <a:schemeClr val="accent3">
+                <a:shade val="45000"/>
+                <a:satMod val="135000"/>
+              </a:schemeClr>
+              <a:prstClr val="white"/>
+            </a:duotone>
             <a:extLst>
               <a:ext uri="{28A0092B-C50C-407E-A947-70E740481C1C}">
                 <a14:useLocalDpi xmlns:a14="http://schemas.microsoft.com/office/drawing/2010/main" val="0"/>
@@ -6356,7 +6363,7 @@
           <p:nvPr/>
         </p:nvPicPr>
         <p:blipFill>
-          <a:blip r:embed="rId2">
+          <a:blip r:embed="rId2" cstate="email">
             <a:extLst>
               <a:ext uri="{28A0092B-C50C-407E-A947-70E740481C1C}">
                 <a14:useLocalDpi xmlns:a14="http://schemas.microsoft.com/office/drawing/2010/main" val="0"/>
@@ -7018,7 +7025,7 @@
           <p:nvPr/>
         </p:nvPicPr>
         <p:blipFill>
-          <a:blip r:embed="rId3">
+          <a:blip r:embed="rId3" cstate="email">
             <a:duotone>
               <a:schemeClr val="accent3">
                 <a:shade val="45000"/>
@@ -7072,7 +7079,7 @@
           <p:nvPr/>
         </p:nvPicPr>
         <p:blipFill>
-          <a:blip r:embed="rId4">
+          <a:blip r:embed="rId4" cstate="email">
             <a:duotone>
               <a:schemeClr val="accent3">
                 <a:shade val="45000"/>

</xml_diff>